<commit_message>
Dernière MAJ avant mise en ligne
</commit_message>
<xml_diff>
--- a/monitoring_echanges/illus.pptx
+++ b/monitoring_echanges/illus.pptx
@@ -5,10 +5,9 @@
     <p:sldMasterId id="2147483660" r:id="rId1"/>
   </p:sldMasterIdLst>
   <p:sldIdLst>
-    <p:sldId id="257" r:id="rId2"/>
-    <p:sldId id="258" r:id="rId3"/>
-    <p:sldId id="259" r:id="rId4"/>
-    <p:sldId id="260" r:id="rId5"/>
+    <p:sldId id="261" r:id="rId2"/>
+    <p:sldId id="259" r:id="rId3"/>
+    <p:sldId id="260" r:id="rId4"/>
   </p:sldIdLst>
   <p:sldSz cx="9144000" cy="6858000" type="screen4x3"/>
   <p:notesSz cx="6858000" cy="9144000"/>
@@ -12075,6 +12074,52 @@
       </p:grpSpPr>
       <p:sp>
         <p:nvSpPr>
+          <p:cNvPr id="105" name="ZoneTexte 104"/>
+          <p:cNvSpPr txBox="1"/>
+          <p:nvPr/>
+        </p:nvSpPr>
+        <p:spPr>
+          <a:xfrm>
+            <a:off x="1863329" y="5383779"/>
+            <a:ext cx="2091245" cy="276999"/>
+          </a:xfrm>
+          <a:prstGeom prst="rect">
+            <a:avLst/>
+          </a:prstGeom>
+          <a:noFill/>
+        </p:spPr>
+        <p:txBody>
+          <a:bodyPr wrap="square" rtlCol="0">
+            <a:spAutoFit/>
+          </a:bodyPr>
+          <a:lstStyle/>
+          <a:p>
+            <a:pPr algn="ctr"/>
+            <a:r>
+              <a:rPr lang="fr-FR" sz="1200" dirty="0" smtClean="0">
+                <a:solidFill>
+                  <a:schemeClr val="tx2">
+                    <a:lumMod val="65000"/>
+                    <a:lumOff val="35000"/>
+                  </a:schemeClr>
+                </a:solidFill>
+              </a:rPr>
+              <a:t>id=xxx</a:t>
+            </a:r>
+            <a:endParaRPr lang="fr-FR" sz="1200" dirty="0" smtClean="0">
+              <a:solidFill>
+                <a:schemeClr val="tx2">
+                  <a:lumMod val="65000"/>
+                  <a:lumOff val="35000"/>
+                </a:schemeClr>
+              </a:solidFill>
+              <a:latin typeface="+mn-lt"/>
+            </a:endParaRPr>
+          </a:p>
+        </p:txBody>
+      </p:sp>
+      <p:sp>
+        <p:nvSpPr>
           <p:cNvPr id="3" name="Titre 2"/>
           <p:cNvSpPr>
             <a:spLocks noGrp="1"/>
@@ -12088,13 +12133,13 @@
           <a:bodyPr/>
           <a:lstStyle/>
           <a:p>
-            <a:endParaRPr lang="fr-FR"/>
+            <a:endParaRPr lang="fr-FR" dirty="0"/>
           </a:p>
         </p:txBody>
       </p:sp>
       <p:pic>
         <p:nvPicPr>
-          <p:cNvPr id="8" name="Image 7" descr="MATRICES_4-normal-04.png"/>
+          <p:cNvPr id="11" name="Image 10" descr="UC-S3-DATA_Pos.png"/>
           <p:cNvPicPr>
             <a:picLocks noChangeAspect="1"/>
           </p:cNvPicPr>
@@ -12114,845 +12159,27 @@
         </p:blipFill>
         <p:spPr>
           <a:xfrm>
-            <a:off x="1677819" y="2054551"/>
-            <a:ext cx="288032" cy="261197"/>
+            <a:off x="4702356" y="5374859"/>
+            <a:ext cx="521221" cy="692762"/>
           </a:xfrm>
           <a:prstGeom prst="rect">
             <a:avLst/>
           </a:prstGeom>
         </p:spPr>
       </p:pic>
-      <p:pic>
-        <p:nvPicPr>
-          <p:cNvPr id="9" name="Image 8" descr="MATRICES_5-normal-06.png"/>
-          <p:cNvPicPr>
-            <a:picLocks noChangeAspect="1"/>
-          </p:cNvPicPr>
-          <p:nvPr/>
-        </p:nvPicPr>
-        <p:blipFill>
-          <a:blip r:embed="rId3">
-            <a:extLst>
-              <a:ext uri="{28A0092B-C50C-407E-A947-70E740481C1C}">
-                <a14:useLocalDpi xmlns:a14="http://schemas.microsoft.com/office/drawing/2010/main" val="0"/>
-              </a:ext>
-            </a:extLst>
-          </a:blip>
-          <a:stretch>
-            <a:fillRect/>
-          </a:stretch>
-        </p:blipFill>
-        <p:spPr>
-          <a:xfrm>
-            <a:off x="4320862" y="3833146"/>
-            <a:ext cx="654686" cy="587106"/>
-          </a:xfrm>
-          <a:prstGeom prst="rect">
-            <a:avLst/>
-          </a:prstGeom>
-        </p:spPr>
-      </p:pic>
-      <p:pic>
-        <p:nvPicPr>
-          <p:cNvPr id="10" name="Image 9" descr="UC-S2_Pos.png"/>
-          <p:cNvPicPr>
-            <a:picLocks noChangeAspect="1"/>
-          </p:cNvPicPr>
-          <p:nvPr/>
-        </p:nvPicPr>
-        <p:blipFill>
-          <a:blip r:embed="rId4">
-            <a:extLst>
-              <a:ext uri="{28A0092B-C50C-407E-A947-70E740481C1C}">
-                <a14:useLocalDpi xmlns:a14="http://schemas.microsoft.com/office/drawing/2010/main" val="0"/>
-              </a:ext>
-            </a:extLst>
-          </a:blip>
-          <a:stretch>
-            <a:fillRect/>
-          </a:stretch>
-        </p:blipFill>
-        <p:spPr>
-          <a:xfrm>
-            <a:off x="2037859" y="2558607"/>
-            <a:ext cx="475794" cy="813637"/>
-          </a:xfrm>
-          <a:prstGeom prst="rect">
-            <a:avLst/>
-          </a:prstGeom>
-        </p:spPr>
-      </p:pic>
-      <p:pic>
-        <p:nvPicPr>
-          <p:cNvPr id="11" name="Image 10" descr="UC-S3-DATA_Pos.png"/>
-          <p:cNvPicPr>
-            <a:picLocks noChangeAspect="1"/>
-          </p:cNvPicPr>
-          <p:nvPr/>
-        </p:nvPicPr>
-        <p:blipFill>
-          <a:blip r:embed="rId5">
-            <a:extLst>
-              <a:ext uri="{28A0092B-C50C-407E-A947-70E740481C1C}">
-                <a14:useLocalDpi xmlns:a14="http://schemas.microsoft.com/office/drawing/2010/main" val="0"/>
-              </a:ext>
-            </a:extLst>
-          </a:blip>
-          <a:stretch>
-            <a:fillRect/>
-          </a:stretch>
-        </p:blipFill>
-        <p:spPr>
-          <a:xfrm>
-            <a:off x="4474584" y="2607161"/>
-            <a:ext cx="521221" cy="692762"/>
-          </a:xfrm>
-          <a:prstGeom prst="rect">
-            <a:avLst/>
-          </a:prstGeom>
-        </p:spPr>
-      </p:pic>
-      <p:pic>
-        <p:nvPicPr>
-          <p:cNvPr id="12" name="Image 11" descr="20061.png"/>
-          <p:cNvPicPr>
-            <a:picLocks noChangeAspect="1"/>
-          </p:cNvPicPr>
-          <p:nvPr/>
-        </p:nvPicPr>
-        <p:blipFill>
-          <a:blip r:embed="rId6">
-            <a:extLst>
-              <a:ext uri="{28A0092B-C50C-407E-A947-70E740481C1C}">
-                <a14:useLocalDpi xmlns:a14="http://schemas.microsoft.com/office/drawing/2010/main" val="0"/>
-              </a:ext>
-            </a:extLst>
-          </a:blip>
-          <a:stretch>
-            <a:fillRect/>
-          </a:stretch>
-        </p:blipFill>
-        <p:spPr>
-          <a:xfrm>
-            <a:off x="2788523" y="3218910"/>
-            <a:ext cx="226864" cy="226864"/>
-          </a:xfrm>
-          <a:prstGeom prst="rect">
-            <a:avLst/>
-          </a:prstGeom>
-        </p:spPr>
-      </p:pic>
-      <p:pic>
-        <p:nvPicPr>
-          <p:cNvPr id="14" name="Image 13" descr="11.png"/>
-          <p:cNvPicPr>
-            <a:picLocks noChangeAspect="1"/>
-          </p:cNvPicPr>
-          <p:nvPr/>
-        </p:nvPicPr>
-        <p:blipFill>
-          <a:blip r:embed="rId7">
-            <a:extLst>
-              <a:ext uri="{28A0092B-C50C-407E-A947-70E740481C1C}">
-                <a14:useLocalDpi xmlns:a14="http://schemas.microsoft.com/office/drawing/2010/main" val="0"/>
-              </a:ext>
-            </a:extLst>
-          </a:blip>
-          <a:stretch>
-            <a:fillRect/>
-          </a:stretch>
-        </p:blipFill>
-        <p:spPr>
-          <a:xfrm>
-            <a:off x="1605811" y="1622503"/>
-            <a:ext cx="539552" cy="514261"/>
-          </a:xfrm>
-          <a:prstGeom prst="rect">
-            <a:avLst/>
-          </a:prstGeom>
-        </p:spPr>
-      </p:pic>
-      <p:pic>
-        <p:nvPicPr>
-          <p:cNvPr id="15" name="Image 14" descr="11.png"/>
-          <p:cNvPicPr>
-            <a:picLocks noChangeAspect="1"/>
-          </p:cNvPicPr>
-          <p:nvPr/>
-        </p:nvPicPr>
-        <p:blipFill>
-          <a:blip r:embed="rId7">
-            <a:extLst>
-              <a:ext uri="{28A0092B-C50C-407E-A947-70E740481C1C}">
-                <a14:useLocalDpi xmlns:a14="http://schemas.microsoft.com/office/drawing/2010/main" val="0"/>
-              </a:ext>
-            </a:extLst>
-          </a:blip>
-          <a:stretch>
-            <a:fillRect/>
-          </a:stretch>
-        </p:blipFill>
-        <p:spPr>
-          <a:xfrm>
-            <a:off x="2469907" y="1622503"/>
-            <a:ext cx="539552" cy="514261"/>
-          </a:xfrm>
-          <a:prstGeom prst="rect">
-            <a:avLst/>
-          </a:prstGeom>
-        </p:spPr>
-      </p:pic>
-      <p:pic>
-        <p:nvPicPr>
-          <p:cNvPr id="16" name="Image 15" descr="MATRICES_2-normal-09.png"/>
-          <p:cNvPicPr>
-            <a:picLocks noChangeAspect="1"/>
-          </p:cNvPicPr>
-          <p:nvPr/>
-        </p:nvPicPr>
-        <p:blipFill>
-          <a:blip r:embed="rId8">
-            <a:duotone>
-              <a:schemeClr val="accent1">
-                <a:shade val="45000"/>
-                <a:satMod val="135000"/>
-              </a:schemeClr>
-              <a:prstClr val="white"/>
-            </a:duotone>
-            <a:extLst>
-              <a:ext uri="{28A0092B-C50C-407E-A947-70E740481C1C}">
-                <a14:useLocalDpi xmlns:a14="http://schemas.microsoft.com/office/drawing/2010/main" val="0"/>
-              </a:ext>
-            </a:extLst>
-          </a:blip>
-          <a:stretch>
-            <a:fillRect/>
-          </a:stretch>
-        </p:blipFill>
-        <p:spPr>
-          <a:xfrm>
-            <a:off x="2397899" y="3127321"/>
-            <a:ext cx="295382" cy="295382"/>
-          </a:xfrm>
-          <a:prstGeom prst="rect">
-            <a:avLst/>
-          </a:prstGeom>
-        </p:spPr>
-      </p:pic>
-      <p:pic>
-        <p:nvPicPr>
-          <p:cNvPr id="17" name="Image 16" descr="MATRICES_4-normal-04.png"/>
-          <p:cNvPicPr>
-            <a:picLocks noChangeAspect="1"/>
-          </p:cNvPicPr>
-          <p:nvPr/>
-        </p:nvPicPr>
-        <p:blipFill>
-          <a:blip r:embed="rId2">
-            <a:extLst>
-              <a:ext uri="{28A0092B-C50C-407E-A947-70E740481C1C}">
-                <a14:useLocalDpi xmlns:a14="http://schemas.microsoft.com/office/drawing/2010/main" val="0"/>
-              </a:ext>
-            </a:extLst>
-          </a:blip>
-          <a:stretch>
-            <a:fillRect/>
-          </a:stretch>
-        </p:blipFill>
-        <p:spPr>
-          <a:xfrm>
-            <a:off x="2541915" y="2054551"/>
-            <a:ext cx="288032" cy="261197"/>
-          </a:xfrm>
-          <a:prstGeom prst="rect">
-            <a:avLst/>
-          </a:prstGeom>
-        </p:spPr>
-      </p:pic>
-      <p:sp>
-        <p:nvSpPr>
-          <p:cNvPr id="20" name="ZoneTexte 19"/>
-          <p:cNvSpPr txBox="1"/>
-          <p:nvPr/>
-        </p:nvSpPr>
-        <p:spPr>
-          <a:xfrm>
-            <a:off x="3045971" y="3326499"/>
-            <a:ext cx="684790" cy="276999"/>
-          </a:xfrm>
-          <a:prstGeom prst="rect">
-            <a:avLst/>
-          </a:prstGeom>
-          <a:noFill/>
-        </p:spPr>
-        <p:txBody>
-          <a:bodyPr wrap="none" rtlCol="0">
-            <a:spAutoFit/>
-          </a:bodyPr>
-          <a:lstStyle/>
-          <a:p>
-            <a:pPr defTabSz="914400" eaLnBrk="0" fontAlgn="base" hangingPunct="0">
-              <a:spcBef>
-                <a:spcPct val="0"/>
-              </a:spcBef>
-              <a:spcAft>
-                <a:spcPct val="0"/>
-              </a:spcAft>
-            </a:pPr>
-            <a:r>
-              <a:rPr lang="fr-FR" sz="1200" i="1" dirty="0" smtClean="0">
-                <a:solidFill>
-                  <a:schemeClr val="bg1">
-                    <a:lumMod val="65000"/>
-                  </a:schemeClr>
-                </a:solidFill>
-                <a:latin typeface="Arial"/>
-                <a:ea typeface="ＭＳ Ｐゴシック" pitchFamily="-104" charset="-128"/>
-              </a:rPr>
-              <a:t>Queue</a:t>
-            </a:r>
-            <a:endParaRPr lang="fr-FR" sz="1200" i="1" dirty="0">
-              <a:solidFill>
-                <a:schemeClr val="bg1">
-                  <a:lumMod val="65000"/>
-                </a:schemeClr>
-              </a:solidFill>
-              <a:latin typeface="Arial"/>
-              <a:ea typeface="ＭＳ Ｐゴシック" pitchFamily="-104" charset="-128"/>
-            </a:endParaRPr>
-          </a:p>
-        </p:txBody>
-      </p:sp>
-      <p:pic>
-        <p:nvPicPr>
-          <p:cNvPr id="21" name="Image 20" descr="MATRICES_4-normal-04.png"/>
-          <p:cNvPicPr>
-            <a:picLocks noChangeAspect="1"/>
-          </p:cNvPicPr>
-          <p:nvPr/>
-        </p:nvPicPr>
-        <p:blipFill>
-          <a:blip r:embed="rId2">
-            <a:extLst>
-              <a:ext uri="{28A0092B-C50C-407E-A947-70E740481C1C}">
-                <a14:useLocalDpi xmlns:a14="http://schemas.microsoft.com/office/drawing/2010/main" val="0"/>
-              </a:ext>
-            </a:extLst>
-          </a:blip>
-          <a:stretch>
-            <a:fillRect/>
-          </a:stretch>
-        </p:blipFill>
-        <p:spPr>
-          <a:xfrm>
-            <a:off x="1893843" y="3782743"/>
-            <a:ext cx="288032" cy="261197"/>
-          </a:xfrm>
-          <a:prstGeom prst="rect">
-            <a:avLst/>
-          </a:prstGeom>
-        </p:spPr>
-      </p:pic>
-      <p:pic>
-        <p:nvPicPr>
-          <p:cNvPr id="22" name="Image 21" descr="11.png"/>
-          <p:cNvPicPr>
-            <a:picLocks noChangeAspect="1"/>
-          </p:cNvPicPr>
-          <p:nvPr/>
-        </p:nvPicPr>
-        <p:blipFill>
-          <a:blip r:embed="rId7">
-            <a:extLst>
-              <a:ext uri="{28A0092B-C50C-407E-A947-70E740481C1C}">
-                <a14:useLocalDpi xmlns:a14="http://schemas.microsoft.com/office/drawing/2010/main" val="0"/>
-              </a:ext>
-            </a:extLst>
-          </a:blip>
-          <a:stretch>
-            <a:fillRect/>
-          </a:stretch>
-        </p:blipFill>
-        <p:spPr>
-          <a:xfrm>
-            <a:off x="1605811" y="3854751"/>
-            <a:ext cx="539552" cy="514261"/>
-          </a:xfrm>
-          <a:prstGeom prst="rect">
-            <a:avLst/>
-          </a:prstGeom>
-        </p:spPr>
-      </p:pic>
-      <p:pic>
-        <p:nvPicPr>
-          <p:cNvPr id="23" name="Image 22" descr="11.png"/>
-          <p:cNvPicPr>
-            <a:picLocks noChangeAspect="1"/>
-          </p:cNvPicPr>
-          <p:nvPr/>
-        </p:nvPicPr>
-        <p:blipFill>
-          <a:blip r:embed="rId7">
-            <a:extLst>
-              <a:ext uri="{28A0092B-C50C-407E-A947-70E740481C1C}">
-                <a14:useLocalDpi xmlns:a14="http://schemas.microsoft.com/office/drawing/2010/main" val="0"/>
-              </a:ext>
-            </a:extLst>
-          </a:blip>
-          <a:stretch>
-            <a:fillRect/>
-          </a:stretch>
-        </p:blipFill>
-        <p:spPr>
-          <a:xfrm>
-            <a:off x="2469907" y="3854751"/>
-            <a:ext cx="539552" cy="514261"/>
-          </a:xfrm>
-          <a:prstGeom prst="rect">
-            <a:avLst/>
-          </a:prstGeom>
-        </p:spPr>
-      </p:pic>
-      <p:pic>
-        <p:nvPicPr>
-          <p:cNvPr id="24" name="Image 23" descr="MATRICES_4-normal-04.png"/>
-          <p:cNvPicPr>
-            <a:picLocks noChangeAspect="1"/>
-          </p:cNvPicPr>
-          <p:nvPr/>
-        </p:nvPicPr>
-        <p:blipFill>
-          <a:blip r:embed="rId2">
-            <a:extLst>
-              <a:ext uri="{28A0092B-C50C-407E-A947-70E740481C1C}">
-                <a14:useLocalDpi xmlns:a14="http://schemas.microsoft.com/office/drawing/2010/main" val="0"/>
-              </a:ext>
-            </a:extLst>
-          </a:blip>
-          <a:stretch>
-            <a:fillRect/>
-          </a:stretch>
-        </p:blipFill>
-        <p:spPr>
-          <a:xfrm>
-            <a:off x="2901955" y="3782743"/>
-            <a:ext cx="288032" cy="261197"/>
-          </a:xfrm>
-          <a:prstGeom prst="rect">
-            <a:avLst/>
-          </a:prstGeom>
-        </p:spPr>
-      </p:pic>
-      <p:sp>
-        <p:nvSpPr>
-          <p:cNvPr id="27" name="ZoneTexte 26"/>
-          <p:cNvSpPr txBox="1"/>
-          <p:nvPr/>
-        </p:nvSpPr>
-        <p:spPr>
-          <a:xfrm>
-            <a:off x="4356975" y="2360197"/>
-            <a:ext cx="620783" cy="276999"/>
-          </a:xfrm>
-          <a:prstGeom prst="rect">
-            <a:avLst/>
-          </a:prstGeom>
-          <a:noFill/>
-        </p:spPr>
-        <p:txBody>
-          <a:bodyPr wrap="none" rtlCol="0">
-            <a:spAutoFit/>
-          </a:bodyPr>
-          <a:lstStyle/>
-          <a:p>
-            <a:pPr defTabSz="914400" eaLnBrk="0" fontAlgn="base" hangingPunct="0">
-              <a:spcBef>
-                <a:spcPct val="0"/>
-              </a:spcBef>
-              <a:spcAft>
-                <a:spcPct val="0"/>
-              </a:spcAft>
-            </a:pPr>
-            <a:r>
-              <a:rPr lang="fr-FR" sz="1200" dirty="0">
-                <a:solidFill>
-                  <a:srgbClr val="15AABE"/>
-                </a:solidFill>
-                <a:latin typeface="Arial"/>
-                <a:ea typeface="ＭＳ Ｐゴシック" pitchFamily="-104" charset="-128"/>
-              </a:rPr>
-              <a:t>SGBD</a:t>
-            </a:r>
-          </a:p>
-        </p:txBody>
-      </p:sp>
-      <p:sp>
-        <p:nvSpPr>
-          <p:cNvPr id="28" name="ZoneTexte 27"/>
-          <p:cNvSpPr txBox="1"/>
-          <p:nvPr/>
-        </p:nvSpPr>
-        <p:spPr>
-          <a:xfrm>
-            <a:off x="1013394" y="2988077"/>
-            <a:ext cx="1023011" cy="461665"/>
-          </a:xfrm>
-          <a:prstGeom prst="rect">
-            <a:avLst/>
-          </a:prstGeom>
-          <a:noFill/>
-        </p:spPr>
-        <p:txBody>
-          <a:bodyPr wrap="none" rtlCol="0">
-            <a:spAutoFit/>
-          </a:bodyPr>
-          <a:lstStyle/>
-          <a:p>
-            <a:pPr algn="r" defTabSz="914400" eaLnBrk="0" fontAlgn="base" hangingPunct="0">
-              <a:spcBef>
-                <a:spcPct val="0"/>
-              </a:spcBef>
-              <a:spcAft>
-                <a:spcPct val="0"/>
-              </a:spcAft>
-            </a:pPr>
-            <a:r>
-              <a:rPr lang="fr-FR" sz="1200" dirty="0" smtClean="0">
-                <a:solidFill>
-                  <a:srgbClr val="15AABE"/>
-                </a:solidFill>
-                <a:latin typeface="Arial"/>
-                <a:ea typeface="ＭＳ Ｐゴシック" pitchFamily="-104" charset="-128"/>
-              </a:rPr>
-              <a:t>Middleware</a:t>
-            </a:r>
-            <a:r>
-              <a:rPr lang="fr-FR" sz="1200" dirty="0">
-                <a:solidFill>
-                  <a:srgbClr val="15AABE"/>
-                </a:solidFill>
-                <a:latin typeface="Arial"/>
-                <a:ea typeface="ＭＳ Ｐゴシック" pitchFamily="-104" charset="-128"/>
-              </a:rPr>
-              <a:t/>
-            </a:r>
-            <a:br>
-              <a:rPr lang="fr-FR" sz="1200" dirty="0">
-                <a:solidFill>
-                  <a:srgbClr val="15AABE"/>
-                </a:solidFill>
-                <a:latin typeface="Arial"/>
-                <a:ea typeface="ＭＳ Ｐゴシック" pitchFamily="-104" charset="-128"/>
-              </a:rPr>
-            </a:br>
-            <a:r>
-              <a:rPr lang="fr-FR" sz="1200" dirty="0" smtClean="0">
-                <a:solidFill>
-                  <a:srgbClr val="15AABE"/>
-                </a:solidFill>
-                <a:latin typeface="Arial"/>
-                <a:ea typeface="ＭＳ Ｐゴシック" pitchFamily="-104" charset="-128"/>
-              </a:rPr>
-              <a:t>de message</a:t>
-            </a:r>
-            <a:endParaRPr lang="fr-FR" sz="1200" dirty="0" smtClean="0">
-              <a:solidFill>
-                <a:srgbClr val="15AABE"/>
-              </a:solidFill>
-              <a:latin typeface="Arial"/>
-              <a:ea typeface="ＭＳ Ｐゴシック" pitchFamily="-104" charset="-128"/>
-            </a:endParaRPr>
-          </a:p>
-        </p:txBody>
-      </p:sp>
       <p:cxnSp>
         <p:nvCxnSpPr>
-          <p:cNvPr id="36" name="Connecteur en angle 35"/>
+          <p:cNvPr id="62" name="Connecteur droit avec flèche 61"/>
           <p:cNvCxnSpPr>
-            <a:stCxn id="17" idx="2"/>
-            <a:endCxn id="10" idx="0"/>
+            <a:stCxn id="11" idx="3"/>
+            <a:endCxn id="100" idx="1"/>
           </p:cNvCxnSpPr>
           <p:nvPr/>
         </p:nvCxnSpPr>
         <p:spPr bwMode="auto">
-          <a:xfrm rot="5400000">
-            <a:off x="2359415" y="2232090"/>
-            <a:ext cx="242859" cy="410175"/>
-          </a:xfrm>
-          <a:prstGeom prst="bentConnector3">
-            <a:avLst/>
-          </a:prstGeom>
-          <a:ln w="9525" cmpd="sng">
-            <a:headEnd type="none" w="med" len="med"/>
-            <a:tailEnd type="arrow"/>
-          </a:ln>
-          <a:effectLst/>
-        </p:spPr>
-        <p:style>
-          <a:lnRef idx="3">
-            <a:schemeClr val="accent6"/>
-          </a:lnRef>
-          <a:fillRef idx="0">
-            <a:schemeClr val="accent6"/>
-          </a:fillRef>
-          <a:effectRef idx="2">
-            <a:schemeClr val="accent6"/>
-          </a:effectRef>
-          <a:fontRef idx="minor">
-            <a:schemeClr val="tx1"/>
-          </a:fontRef>
-        </p:style>
-      </p:cxnSp>
-      <p:cxnSp>
-        <p:nvCxnSpPr>
-          <p:cNvPr id="38" name="Connecteur en angle 37"/>
-          <p:cNvCxnSpPr>
-            <a:stCxn id="8" idx="2"/>
-            <a:endCxn id="10" idx="1"/>
-          </p:cNvCxnSpPr>
-          <p:nvPr/>
-        </p:nvCxnSpPr>
-        <p:spPr bwMode="auto">
-          <a:xfrm rot="16200000" flipH="1">
-            <a:off x="1605008" y="2532575"/>
-            <a:ext cx="649678" cy="216024"/>
-          </a:xfrm>
-          <a:prstGeom prst="bentConnector2">
-            <a:avLst/>
-          </a:prstGeom>
-          <a:ln w="9525" cmpd="sng">
-            <a:headEnd type="none" w="med" len="med"/>
-            <a:tailEnd type="arrow"/>
-          </a:ln>
-          <a:effectLst/>
-        </p:spPr>
-        <p:style>
-          <a:lnRef idx="3">
-            <a:schemeClr val="accent6"/>
-          </a:lnRef>
-          <a:fillRef idx="0">
-            <a:schemeClr val="accent6"/>
-          </a:fillRef>
-          <a:effectRef idx="2">
-            <a:schemeClr val="accent6"/>
-          </a:effectRef>
-          <a:fontRef idx="minor">
-            <a:schemeClr val="tx1"/>
-          </a:fontRef>
-        </p:style>
-      </p:cxnSp>
-      <p:cxnSp>
-        <p:nvCxnSpPr>
-          <p:cNvPr id="45" name="Connecteur en angle 44"/>
-          <p:cNvCxnSpPr>
-            <a:stCxn id="10" idx="2"/>
-            <a:endCxn id="22" idx="0"/>
-          </p:cNvCxnSpPr>
-          <p:nvPr/>
-        </p:nvCxnSpPr>
-        <p:spPr bwMode="auto">
-          <a:xfrm rot="5400000">
-            <a:off x="1834419" y="3413413"/>
-            <a:ext cx="482507" cy="400169"/>
-          </a:xfrm>
-          <a:prstGeom prst="bentConnector3">
-            <a:avLst>
-              <a:gd name="adj1" fmla="val 50000"/>
-            </a:avLst>
-          </a:prstGeom>
-          <a:ln w="9525" cmpd="sng">
-            <a:headEnd type="none" w="med" len="med"/>
-            <a:tailEnd type="arrow"/>
-          </a:ln>
-          <a:effectLst/>
-        </p:spPr>
-        <p:style>
-          <a:lnRef idx="3">
-            <a:schemeClr val="accent6"/>
-          </a:lnRef>
-          <a:fillRef idx="0">
-            <a:schemeClr val="accent6"/>
-          </a:fillRef>
-          <a:effectRef idx="2">
-            <a:schemeClr val="accent6"/>
-          </a:effectRef>
-          <a:fontRef idx="minor">
-            <a:schemeClr val="tx1"/>
-          </a:fontRef>
-        </p:style>
-      </p:cxnSp>
-      <p:cxnSp>
-        <p:nvCxnSpPr>
-          <p:cNvPr id="52" name="Connecteur en angle 51"/>
-          <p:cNvCxnSpPr/>
-          <p:nvPr/>
-        </p:nvCxnSpPr>
-        <p:spPr bwMode="auto">
-          <a:xfrm rot="16200000" flipH="1">
-            <a:off x="2325892" y="3422702"/>
-            <a:ext cx="576063" cy="432048"/>
-          </a:xfrm>
-          <a:prstGeom prst="bentConnector3">
-            <a:avLst>
-              <a:gd name="adj1" fmla="val 50000"/>
-            </a:avLst>
-          </a:prstGeom>
-          <a:ln w="9525" cmpd="sng">
-            <a:headEnd type="none" w="med" len="med"/>
-            <a:tailEnd type="arrow"/>
-          </a:ln>
-          <a:effectLst/>
-        </p:spPr>
-        <p:style>
-          <a:lnRef idx="3">
-            <a:schemeClr val="accent6"/>
-          </a:lnRef>
-          <a:fillRef idx="0">
-            <a:schemeClr val="accent6"/>
-          </a:fillRef>
-          <a:effectRef idx="2">
-            <a:schemeClr val="accent6"/>
-          </a:effectRef>
-          <a:fontRef idx="minor">
-            <a:schemeClr val="tx1"/>
-          </a:fontRef>
-        </p:style>
-      </p:cxnSp>
-      <p:pic>
-        <p:nvPicPr>
-          <p:cNvPr id="58" name="Image 57" descr="51541.png"/>
-          <p:cNvPicPr>
-            <a:picLocks noChangeAspect="1"/>
-          </p:cNvPicPr>
-          <p:nvPr/>
-        </p:nvPicPr>
-        <p:blipFill>
-          <a:blip r:embed="rId9">
-            <a:duotone>
-              <a:schemeClr val="accent2">
-                <a:shade val="45000"/>
-                <a:satMod val="135000"/>
-              </a:schemeClr>
-              <a:prstClr val="white"/>
-            </a:duotone>
-            <a:extLst>
-              <a:ext uri="{28A0092B-C50C-407E-A947-70E740481C1C}">
-                <a14:useLocalDpi xmlns:a14="http://schemas.microsoft.com/office/drawing/2010/main" val="0"/>
-              </a:ext>
-            </a:extLst>
-          </a:blip>
-          <a:stretch>
-            <a:fillRect/>
-          </a:stretch>
-        </p:blipFill>
-        <p:spPr>
-          <a:xfrm>
-            <a:off x="4375022" y="3904674"/>
-            <a:ext cx="521903" cy="360040"/>
-          </a:xfrm>
-          <a:prstGeom prst="rect">
-            <a:avLst/>
-          </a:prstGeom>
-        </p:spPr>
-      </p:pic>
-      <p:sp>
-        <p:nvSpPr>
-          <p:cNvPr id="59" name="ZoneTexte 58"/>
-          <p:cNvSpPr txBox="1"/>
-          <p:nvPr/>
-        </p:nvSpPr>
-        <p:spPr>
-          <a:xfrm>
-            <a:off x="1821835" y="4430815"/>
-            <a:ext cx="1052529" cy="276999"/>
-          </a:xfrm>
-          <a:prstGeom prst="rect">
-            <a:avLst/>
-          </a:prstGeom>
-          <a:noFill/>
-        </p:spPr>
-        <p:txBody>
-          <a:bodyPr wrap="none" rtlCol="0">
-            <a:spAutoFit/>
-          </a:bodyPr>
-          <a:lstStyle/>
-          <a:p>
-            <a:pPr defTabSz="914400" eaLnBrk="0" fontAlgn="base" hangingPunct="0">
-              <a:spcBef>
-                <a:spcPct val="0"/>
-              </a:spcBef>
-              <a:spcAft>
-                <a:spcPct val="0"/>
-              </a:spcAft>
-            </a:pPr>
-            <a:r>
-              <a:rPr lang="fr-FR" sz="1200" i="1" dirty="0">
-                <a:solidFill>
-                  <a:srgbClr val="15AABE"/>
-                </a:solidFill>
-                <a:latin typeface="Arial"/>
-                <a:ea typeface="ＭＳ Ｐゴシック" pitchFamily="-104" charset="-128"/>
-              </a:rPr>
-              <a:t>Applications</a:t>
-            </a:r>
-          </a:p>
-        </p:txBody>
-      </p:sp>
-      <p:sp>
-        <p:nvSpPr>
-          <p:cNvPr id="60" name="ZoneTexte 59"/>
-          <p:cNvSpPr txBox="1"/>
-          <p:nvPr/>
-        </p:nvSpPr>
-        <p:spPr>
-          <a:xfrm>
-            <a:off x="4300691" y="4382887"/>
-            <a:ext cx="787357" cy="276999"/>
-          </a:xfrm>
-          <a:prstGeom prst="rect">
-            <a:avLst/>
-          </a:prstGeom>
-          <a:noFill/>
-        </p:spPr>
-        <p:txBody>
-          <a:bodyPr wrap="none" rtlCol="0">
-            <a:spAutoFit/>
-          </a:bodyPr>
-          <a:lstStyle/>
-          <a:p>
-            <a:pPr defTabSz="914400" eaLnBrk="0" fontAlgn="base" hangingPunct="0">
-              <a:spcBef>
-                <a:spcPct val="0"/>
-              </a:spcBef>
-              <a:spcAft>
-                <a:spcPct val="0"/>
-              </a:spcAft>
-            </a:pPr>
-            <a:r>
-              <a:rPr lang="fr-FR" sz="1200" i="1" dirty="0">
-                <a:solidFill>
-                  <a:srgbClr val="15AABE"/>
-                </a:solidFill>
-                <a:latin typeface="Arial"/>
-                <a:ea typeface="ＭＳ Ｐゴシック" pitchFamily="-104" charset="-128"/>
-              </a:rPr>
-              <a:t>Console</a:t>
-            </a:r>
-          </a:p>
-        </p:txBody>
-      </p:sp>
-      <p:cxnSp>
-        <p:nvCxnSpPr>
-          <p:cNvPr id="62" name="Connecteur droit avec flèche 61"/>
-          <p:cNvCxnSpPr>
-            <a:endCxn id="9" idx="0"/>
-          </p:cNvCxnSpPr>
-          <p:nvPr/>
-        </p:nvCxnSpPr>
-        <p:spPr bwMode="auto">
-          <a:xfrm>
-            <a:off x="4648205" y="3218910"/>
-            <a:ext cx="0" cy="614236"/>
+          <a:xfrm>
+            <a:off x="5223577" y="5721240"/>
+            <a:ext cx="638963" cy="688"/>
           </a:xfrm>
           <a:prstGeom prst="straightConnector1">
             <a:avLst/>
@@ -12975,16 +12202,228 @@
           <a:effectLst/>
         </p:spPr>
       </p:cxnSp>
-      <p:sp>
-        <p:nvSpPr>
-          <p:cNvPr id="29" name="Cylindre 28"/>
+      <p:pic>
+        <p:nvPicPr>
+          <p:cNvPr id="4" name="Image 3" descr="OctoMan_Pos.png"/>
+          <p:cNvPicPr>
+            <a:picLocks noChangeAspect="1"/>
+          </p:cNvPicPr>
+          <p:nvPr/>
+        </p:nvPicPr>
+        <p:blipFill>
+          <a:blip r:embed="rId3">
+            <a:extLst>
+              <a:ext uri="{28A0092B-C50C-407E-A947-70E740481C1C}">
+                <a14:useLocalDpi xmlns:a14="http://schemas.microsoft.com/office/drawing/2010/main" val="0"/>
+              </a:ext>
+            </a:extLst>
+          </a:blip>
+          <a:stretch>
+            <a:fillRect/>
+          </a:stretch>
+        </p:blipFill>
+        <p:spPr>
+          <a:xfrm>
+            <a:off x="1906998" y="1540290"/>
+            <a:ext cx="438627" cy="573904"/>
+          </a:xfrm>
+          <a:prstGeom prst="rect">
+            <a:avLst/>
+          </a:prstGeom>
+        </p:spPr>
+      </p:pic>
+      <p:cxnSp>
+        <p:nvCxnSpPr>
+          <p:cNvPr id="6" name="Connecteur droit avec flèche 5"/>
+          <p:cNvCxnSpPr>
+            <a:stCxn id="4" idx="2"/>
+            <a:endCxn id="2" idx="0"/>
+          </p:cNvCxnSpPr>
+          <p:nvPr/>
+        </p:nvCxnSpPr>
+        <p:spPr bwMode="auto">
+          <a:xfrm flipH="1">
+            <a:off x="2126311" y="2114194"/>
+            <a:ext cx="1" cy="309467"/>
+          </a:xfrm>
+          <a:prstGeom prst="straightConnector1">
+            <a:avLst/>
+          </a:prstGeom>
+          <a:ln w="9525" cmpd="sng">
+            <a:headEnd type="none" w="med" len="med"/>
+            <a:tailEnd type="arrow"/>
+          </a:ln>
+          <a:effectLst/>
+        </p:spPr>
+        <p:style>
+          <a:lnRef idx="3">
+            <a:schemeClr val="accent6"/>
+          </a:lnRef>
+          <a:fillRef idx="0">
+            <a:schemeClr val="accent6"/>
+          </a:fillRef>
+          <a:effectRef idx="2">
+            <a:schemeClr val="accent6"/>
+          </a:effectRef>
+          <a:fontRef idx="minor">
+            <a:schemeClr val="tx1"/>
+          </a:fontRef>
+        </p:style>
+      </p:cxnSp>
+      <p:cxnSp>
+        <p:nvCxnSpPr>
+          <p:cNvPr id="41" name="Connecteur droit avec flèche 40"/>
+          <p:cNvCxnSpPr>
+            <a:stCxn id="2" idx="1"/>
+            <a:endCxn id="72" idx="0"/>
+          </p:cNvCxnSpPr>
+          <p:nvPr/>
+        </p:nvCxnSpPr>
+        <p:spPr bwMode="auto">
+          <a:xfrm flipH="1">
+            <a:off x="1449422" y="2783659"/>
+            <a:ext cx="261507" cy="584453"/>
+          </a:xfrm>
+          <a:prstGeom prst="straightConnector1">
+            <a:avLst/>
+          </a:prstGeom>
+          <a:ln w="9525" cmpd="sng">
+            <a:headEnd type="none" w="med" len="med"/>
+            <a:tailEnd type="arrow"/>
+          </a:ln>
+          <a:effectLst/>
+        </p:spPr>
+        <p:style>
+          <a:lnRef idx="3">
+            <a:schemeClr val="accent6"/>
+          </a:lnRef>
+          <a:fillRef idx="0">
+            <a:schemeClr val="accent6"/>
+          </a:fillRef>
+          <a:effectRef idx="2">
+            <a:schemeClr val="accent6"/>
+          </a:effectRef>
+          <a:fontRef idx="minor">
+            <a:schemeClr val="tx1"/>
+          </a:fontRef>
+        </p:style>
+      </p:cxnSp>
+      <p:cxnSp>
+        <p:nvCxnSpPr>
+          <p:cNvPr id="44" name="Connecteur droit avec flèche 43"/>
+          <p:cNvCxnSpPr>
+            <a:stCxn id="2" idx="3"/>
+            <a:endCxn id="68" idx="0"/>
+          </p:cNvCxnSpPr>
+          <p:nvPr/>
+        </p:nvCxnSpPr>
+        <p:spPr bwMode="auto">
+          <a:xfrm>
+            <a:off x="2541693" y="2783659"/>
+            <a:ext cx="324526" cy="1436773"/>
+          </a:xfrm>
+          <a:prstGeom prst="straightConnector1">
+            <a:avLst/>
+          </a:prstGeom>
+          <a:ln w="9525" cmpd="sng">
+            <a:headEnd type="none" w="med" len="med"/>
+            <a:tailEnd type="arrow"/>
+          </a:ln>
+          <a:effectLst/>
+        </p:spPr>
+        <p:style>
+          <a:lnRef idx="3">
+            <a:schemeClr val="accent6"/>
+          </a:lnRef>
+          <a:fillRef idx="0">
+            <a:schemeClr val="accent6"/>
+          </a:fillRef>
+          <a:effectRef idx="2">
+            <a:schemeClr val="accent6"/>
+          </a:effectRef>
+          <a:fontRef idx="minor">
+            <a:schemeClr val="tx1"/>
+          </a:fontRef>
+        </p:style>
+      </p:cxnSp>
+      <p:pic>
+        <p:nvPicPr>
+          <p:cNvPr id="47" name="Image 46" descr="20061.png"/>
+          <p:cNvPicPr>
+            <a:picLocks noChangeAspect="1"/>
+          </p:cNvPicPr>
+          <p:nvPr/>
+        </p:nvPicPr>
+        <p:blipFill>
+          <a:blip r:embed="rId4">
+            <a:extLst>
+              <a:ext uri="{28A0092B-C50C-407E-A947-70E740481C1C}">
+                <a14:useLocalDpi xmlns:a14="http://schemas.microsoft.com/office/drawing/2010/main" val="0"/>
+              </a:ext>
+            </a:extLst>
+          </a:blip>
+          <a:stretch>
+            <a:fillRect/>
+          </a:stretch>
+        </p:blipFill>
+        <p:spPr>
+          <a:xfrm>
+            <a:off x="2707427" y="3290031"/>
+            <a:ext cx="226864" cy="226864"/>
+          </a:xfrm>
+          <a:prstGeom prst="rect">
+            <a:avLst/>
+          </a:prstGeom>
+        </p:spPr>
+      </p:pic>
+      <p:cxnSp>
+        <p:nvCxnSpPr>
+          <p:cNvPr id="53" name="Connecteur droit avec flèche 52"/>
+          <p:cNvCxnSpPr>
+            <a:stCxn id="72" idx="2"/>
+            <a:endCxn id="76" idx="0"/>
+          </p:cNvCxnSpPr>
+          <p:nvPr/>
+        </p:nvCxnSpPr>
+        <p:spPr bwMode="auto">
+          <a:xfrm>
+            <a:off x="1449422" y="4088108"/>
+            <a:ext cx="0" cy="967013"/>
+          </a:xfrm>
+          <a:prstGeom prst="straightConnector1">
+            <a:avLst/>
+          </a:prstGeom>
+          <a:ln w="9525" cmpd="sng">
+            <a:headEnd type="none" w="med" len="med"/>
+            <a:tailEnd type="arrow"/>
+          </a:ln>
+          <a:effectLst/>
+        </p:spPr>
+        <p:style>
+          <a:lnRef idx="3">
+            <a:schemeClr val="accent6"/>
+          </a:lnRef>
+          <a:fillRef idx="0">
+            <a:schemeClr val="accent6"/>
+          </a:fillRef>
+          <a:effectRef idx="2">
+            <a:schemeClr val="accent6"/>
+          </a:effectRef>
+          <a:fontRef idx="minor">
+            <a:schemeClr val="tx1"/>
+          </a:fontRef>
+        </p:style>
+      </p:cxnSp>
+      <p:sp>
+        <p:nvSpPr>
+          <p:cNvPr id="55" name="Cylindre 54"/>
           <p:cNvSpPr/>
           <p:nvPr/>
         </p:nvSpPr>
         <p:spPr>
           <a:xfrm>
-            <a:off x="3234658" y="2870245"/>
-            <a:ext cx="216024" cy="514147"/>
+            <a:off x="3954574" y="2423661"/>
+            <a:ext cx="216024" cy="3575317"/>
           </a:xfrm>
           <a:prstGeom prst="can">
             <a:avLst/>
@@ -13035,16 +12474,532 @@
           </a:p>
         </p:txBody>
       </p:sp>
+      <p:grpSp>
+        <p:nvGrpSpPr>
+          <p:cNvPr id="66" name="Grouper 65"/>
+          <p:cNvGrpSpPr/>
+          <p:nvPr/>
+        </p:nvGrpSpPr>
+        <p:grpSpPr>
+          <a:xfrm>
+            <a:off x="1710929" y="2423661"/>
+            <a:ext cx="830764" cy="719996"/>
+            <a:chOff x="1710929" y="2423661"/>
+            <a:chExt cx="830764" cy="719996"/>
+          </a:xfrm>
+        </p:grpSpPr>
+        <p:pic>
+          <p:nvPicPr>
+            <p:cNvPr id="2" name="Image 1" descr="appli2.png"/>
+            <p:cNvPicPr>
+              <a:picLocks noChangeAspect="1"/>
+            </p:cNvPicPr>
+            <p:nvPr/>
+          </p:nvPicPr>
+          <p:blipFill>
+            <a:blip r:embed="rId5">
+              <a:extLst>
+                <a:ext uri="{28A0092B-C50C-407E-A947-70E740481C1C}">
+                  <a14:useLocalDpi xmlns:a14="http://schemas.microsoft.com/office/drawing/2010/main" val="0"/>
+                </a:ext>
+              </a:extLst>
+            </a:blip>
+            <a:stretch>
+              <a:fillRect/>
+            </a:stretch>
+          </p:blipFill>
+          <p:spPr>
+            <a:xfrm>
+              <a:off x="1710929" y="2423661"/>
+              <a:ext cx="830764" cy="719996"/>
+            </a:xfrm>
+            <a:prstGeom prst="rect">
+              <a:avLst/>
+            </a:prstGeom>
+          </p:spPr>
+        </p:pic>
+        <p:sp>
+          <p:nvSpPr>
+            <p:cNvPr id="63" name="Rectangle 62"/>
+            <p:cNvSpPr/>
+            <p:nvPr/>
+          </p:nvSpPr>
+          <p:spPr>
+            <a:xfrm>
+              <a:off x="2275063" y="2901109"/>
+              <a:ext cx="143243" cy="143999"/>
+            </a:xfrm>
+            <a:prstGeom prst="rect">
+              <a:avLst/>
+            </a:prstGeom>
+            <a:solidFill>
+              <a:schemeClr val="accent4"/>
+            </a:solidFill>
+            <a:ln>
+              <a:solidFill>
+                <a:schemeClr val="accent4"/>
+              </a:solidFill>
+            </a:ln>
+          </p:spPr>
+          <p:style>
+            <a:lnRef idx="2">
+              <a:schemeClr val="accent4">
+                <a:shade val="50000"/>
+              </a:schemeClr>
+            </a:lnRef>
+            <a:fillRef idx="1">
+              <a:schemeClr val="accent4"/>
+            </a:fillRef>
+            <a:effectRef idx="0">
+              <a:schemeClr val="accent4"/>
+            </a:effectRef>
+            <a:fontRef idx="minor">
+              <a:schemeClr val="lt1"/>
+            </a:fontRef>
+          </p:style>
+          <p:txBody>
+            <a:bodyPr vert="horz" wrap="square" lIns="91440" tIns="45720" rIns="91440" bIns="45720" numCol="1" rtlCol="0" anchor="ctr" anchorCtr="0" compatLnSpc="1">
+              <a:prstTxWarp prst="textNoShape">
+                <a:avLst/>
+              </a:prstTxWarp>
+            </a:bodyPr>
+            <a:lstStyle/>
+            <a:p>
+              <a:pPr marL="0" marR="0" indent="0" algn="ctr" defTabSz="914400" rtl="0" eaLnBrk="0" fontAlgn="base" latinLnBrk="0" hangingPunct="0">
+                <a:lnSpc>
+                  <a:spcPct val="100000"/>
+                </a:lnSpc>
+                <a:spcBef>
+                  <a:spcPct val="0"/>
+                </a:spcBef>
+                <a:spcAft>
+                  <a:spcPct val="0"/>
+                </a:spcAft>
+                <a:buClrTx/>
+                <a:buSzTx/>
+                <a:buFontTx/>
+                <a:buNone/>
+                <a:tabLst/>
+              </a:pPr>
+              <a:endParaRPr kumimoji="0" lang="fr-FR" sz="1200" b="0" i="0" u="none" strike="noStrike" cap="none" normalizeH="0" baseline="0" dirty="0" smtClean="0">
+                <a:ln>
+                  <a:noFill/>
+                </a:ln>
+                <a:solidFill>
+                  <a:srgbClr val="00A2D8"/>
+                </a:solidFill>
+                <a:effectLst/>
+                <a:latin typeface="+mn-lt"/>
+              </a:endParaRPr>
+            </a:p>
+          </p:txBody>
+        </p:sp>
+      </p:grpSp>
+      <p:grpSp>
+        <p:nvGrpSpPr>
+          <p:cNvPr id="67" name="Grouper 66"/>
+          <p:cNvGrpSpPr/>
+          <p:nvPr/>
+        </p:nvGrpSpPr>
+        <p:grpSpPr>
+          <a:xfrm>
+            <a:off x="2450837" y="4220432"/>
+            <a:ext cx="830764" cy="719996"/>
+            <a:chOff x="1710929" y="2423661"/>
+            <a:chExt cx="830764" cy="719996"/>
+          </a:xfrm>
+        </p:grpSpPr>
+        <p:pic>
+          <p:nvPicPr>
+            <p:cNvPr id="68" name="Image 67" descr="appli2.png"/>
+            <p:cNvPicPr>
+              <a:picLocks noChangeAspect="1"/>
+            </p:cNvPicPr>
+            <p:nvPr/>
+          </p:nvPicPr>
+          <p:blipFill>
+            <a:blip r:embed="rId5">
+              <a:extLst>
+                <a:ext uri="{28A0092B-C50C-407E-A947-70E740481C1C}">
+                  <a14:useLocalDpi xmlns:a14="http://schemas.microsoft.com/office/drawing/2010/main" val="0"/>
+                </a:ext>
+              </a:extLst>
+            </a:blip>
+            <a:stretch>
+              <a:fillRect/>
+            </a:stretch>
+          </p:blipFill>
+          <p:spPr>
+            <a:xfrm>
+              <a:off x="1710929" y="2423661"/>
+              <a:ext cx="830764" cy="719996"/>
+            </a:xfrm>
+            <a:prstGeom prst="rect">
+              <a:avLst/>
+            </a:prstGeom>
+          </p:spPr>
+        </p:pic>
+        <p:sp>
+          <p:nvSpPr>
+            <p:cNvPr id="69" name="Rectangle 68"/>
+            <p:cNvSpPr/>
+            <p:nvPr/>
+          </p:nvSpPr>
+          <p:spPr>
+            <a:xfrm>
+              <a:off x="2275063" y="2901109"/>
+              <a:ext cx="143243" cy="143999"/>
+            </a:xfrm>
+            <a:prstGeom prst="rect">
+              <a:avLst/>
+            </a:prstGeom>
+            <a:solidFill>
+              <a:schemeClr val="accent4"/>
+            </a:solidFill>
+            <a:ln>
+              <a:solidFill>
+                <a:schemeClr val="accent4"/>
+              </a:solidFill>
+            </a:ln>
+          </p:spPr>
+          <p:style>
+            <a:lnRef idx="2">
+              <a:schemeClr val="accent4">
+                <a:shade val="50000"/>
+              </a:schemeClr>
+            </a:lnRef>
+            <a:fillRef idx="1">
+              <a:schemeClr val="accent4"/>
+            </a:fillRef>
+            <a:effectRef idx="0">
+              <a:schemeClr val="accent4"/>
+            </a:effectRef>
+            <a:fontRef idx="minor">
+              <a:schemeClr val="lt1"/>
+            </a:fontRef>
+          </p:style>
+          <p:txBody>
+            <a:bodyPr vert="horz" wrap="square" lIns="91440" tIns="45720" rIns="91440" bIns="45720" numCol="1" rtlCol="0" anchor="ctr" anchorCtr="0" compatLnSpc="1">
+              <a:prstTxWarp prst="textNoShape">
+                <a:avLst/>
+              </a:prstTxWarp>
+            </a:bodyPr>
+            <a:lstStyle/>
+            <a:p>
+              <a:pPr marL="0" marR="0" indent="0" algn="ctr" defTabSz="914400" rtl="0" eaLnBrk="0" fontAlgn="base" latinLnBrk="0" hangingPunct="0">
+                <a:lnSpc>
+                  <a:spcPct val="100000"/>
+                </a:lnSpc>
+                <a:spcBef>
+                  <a:spcPct val="0"/>
+                </a:spcBef>
+                <a:spcAft>
+                  <a:spcPct val="0"/>
+                </a:spcAft>
+                <a:buClrTx/>
+                <a:buSzTx/>
+                <a:buFontTx/>
+                <a:buNone/>
+                <a:tabLst/>
+              </a:pPr>
+              <a:endParaRPr kumimoji="0" lang="fr-FR" sz="1200" b="0" i="0" u="none" strike="noStrike" cap="none" normalizeH="0" baseline="0" dirty="0" smtClean="0">
+                <a:ln>
+                  <a:noFill/>
+                </a:ln>
+                <a:solidFill>
+                  <a:srgbClr val="00A2D8"/>
+                </a:solidFill>
+                <a:effectLst/>
+                <a:latin typeface="+mn-lt"/>
+              </a:endParaRPr>
+            </a:p>
+          </p:txBody>
+        </p:sp>
+      </p:grpSp>
+      <p:grpSp>
+        <p:nvGrpSpPr>
+          <p:cNvPr id="71" name="Grouper 70"/>
+          <p:cNvGrpSpPr/>
+          <p:nvPr/>
+        </p:nvGrpSpPr>
+        <p:grpSpPr>
+          <a:xfrm>
+            <a:off x="1034040" y="3368112"/>
+            <a:ext cx="830764" cy="719996"/>
+            <a:chOff x="1710929" y="2423661"/>
+            <a:chExt cx="830764" cy="719996"/>
+          </a:xfrm>
+        </p:grpSpPr>
+        <p:pic>
+          <p:nvPicPr>
+            <p:cNvPr id="72" name="Image 71" descr="appli2.png"/>
+            <p:cNvPicPr>
+              <a:picLocks noChangeAspect="1"/>
+            </p:cNvPicPr>
+            <p:nvPr/>
+          </p:nvPicPr>
+          <p:blipFill>
+            <a:blip r:embed="rId5">
+              <a:extLst>
+                <a:ext uri="{28A0092B-C50C-407E-A947-70E740481C1C}">
+                  <a14:useLocalDpi xmlns:a14="http://schemas.microsoft.com/office/drawing/2010/main" val="0"/>
+                </a:ext>
+              </a:extLst>
+            </a:blip>
+            <a:stretch>
+              <a:fillRect/>
+            </a:stretch>
+          </p:blipFill>
+          <p:spPr>
+            <a:xfrm>
+              <a:off x="1710929" y="2423661"/>
+              <a:ext cx="830764" cy="719996"/>
+            </a:xfrm>
+            <a:prstGeom prst="rect">
+              <a:avLst/>
+            </a:prstGeom>
+          </p:spPr>
+        </p:pic>
+        <p:sp>
+          <p:nvSpPr>
+            <p:cNvPr id="73" name="Rectangle 72"/>
+            <p:cNvSpPr/>
+            <p:nvPr/>
+          </p:nvSpPr>
+          <p:spPr>
+            <a:xfrm>
+              <a:off x="2275063" y="2901109"/>
+              <a:ext cx="143243" cy="143999"/>
+            </a:xfrm>
+            <a:prstGeom prst="rect">
+              <a:avLst/>
+            </a:prstGeom>
+            <a:solidFill>
+              <a:schemeClr val="accent4"/>
+            </a:solidFill>
+            <a:ln>
+              <a:solidFill>
+                <a:schemeClr val="accent4"/>
+              </a:solidFill>
+            </a:ln>
+          </p:spPr>
+          <p:style>
+            <a:lnRef idx="2">
+              <a:schemeClr val="accent4">
+                <a:shade val="50000"/>
+              </a:schemeClr>
+            </a:lnRef>
+            <a:fillRef idx="1">
+              <a:schemeClr val="accent4"/>
+            </a:fillRef>
+            <a:effectRef idx="0">
+              <a:schemeClr val="accent4"/>
+            </a:effectRef>
+            <a:fontRef idx="minor">
+              <a:schemeClr val="lt1"/>
+            </a:fontRef>
+          </p:style>
+          <p:txBody>
+            <a:bodyPr vert="horz" wrap="square" lIns="91440" tIns="45720" rIns="91440" bIns="45720" numCol="1" rtlCol="0" anchor="ctr" anchorCtr="0" compatLnSpc="1">
+              <a:prstTxWarp prst="textNoShape">
+                <a:avLst/>
+              </a:prstTxWarp>
+            </a:bodyPr>
+            <a:lstStyle/>
+            <a:p>
+              <a:pPr marL="0" marR="0" indent="0" algn="ctr" defTabSz="914400" rtl="0" eaLnBrk="0" fontAlgn="base" latinLnBrk="0" hangingPunct="0">
+                <a:lnSpc>
+                  <a:spcPct val="100000"/>
+                </a:lnSpc>
+                <a:spcBef>
+                  <a:spcPct val="0"/>
+                </a:spcBef>
+                <a:spcAft>
+                  <a:spcPct val="0"/>
+                </a:spcAft>
+                <a:buClrTx/>
+                <a:buSzTx/>
+                <a:buFontTx/>
+                <a:buNone/>
+                <a:tabLst/>
+              </a:pPr>
+              <a:endParaRPr kumimoji="0" lang="fr-FR" sz="1200" b="0" i="0" u="none" strike="noStrike" cap="none" normalizeH="0" baseline="0" dirty="0" smtClean="0">
+                <a:ln>
+                  <a:noFill/>
+                </a:ln>
+                <a:solidFill>
+                  <a:srgbClr val="00A2D8"/>
+                </a:solidFill>
+                <a:effectLst/>
+                <a:latin typeface="+mn-lt"/>
+              </a:endParaRPr>
+            </a:p>
+          </p:txBody>
+        </p:sp>
+      </p:grpSp>
+      <p:grpSp>
+        <p:nvGrpSpPr>
+          <p:cNvPr id="75" name="Grouper 74"/>
+          <p:cNvGrpSpPr/>
+          <p:nvPr/>
+        </p:nvGrpSpPr>
+        <p:grpSpPr>
+          <a:xfrm>
+            <a:off x="1034040" y="5055121"/>
+            <a:ext cx="830764" cy="719996"/>
+            <a:chOff x="1710929" y="2423661"/>
+            <a:chExt cx="830764" cy="719996"/>
+          </a:xfrm>
+        </p:grpSpPr>
+        <p:pic>
+          <p:nvPicPr>
+            <p:cNvPr id="76" name="Image 75" descr="appli2.png"/>
+            <p:cNvPicPr>
+              <a:picLocks noChangeAspect="1"/>
+            </p:cNvPicPr>
+            <p:nvPr/>
+          </p:nvPicPr>
+          <p:blipFill>
+            <a:blip r:embed="rId5">
+              <a:extLst>
+                <a:ext uri="{28A0092B-C50C-407E-A947-70E740481C1C}">
+                  <a14:useLocalDpi xmlns:a14="http://schemas.microsoft.com/office/drawing/2010/main" val="0"/>
+                </a:ext>
+              </a:extLst>
+            </a:blip>
+            <a:stretch>
+              <a:fillRect/>
+            </a:stretch>
+          </p:blipFill>
+          <p:spPr>
+            <a:xfrm>
+              <a:off x="1710929" y="2423661"/>
+              <a:ext cx="830764" cy="719996"/>
+            </a:xfrm>
+            <a:prstGeom prst="rect">
+              <a:avLst/>
+            </a:prstGeom>
+          </p:spPr>
+        </p:pic>
+        <p:sp>
+          <p:nvSpPr>
+            <p:cNvPr id="77" name="Rectangle 76"/>
+            <p:cNvSpPr/>
+            <p:nvPr/>
+          </p:nvSpPr>
+          <p:spPr>
+            <a:xfrm>
+              <a:off x="2275063" y="2901109"/>
+              <a:ext cx="143243" cy="143999"/>
+            </a:xfrm>
+            <a:prstGeom prst="rect">
+              <a:avLst/>
+            </a:prstGeom>
+            <a:solidFill>
+              <a:schemeClr val="accent4"/>
+            </a:solidFill>
+            <a:ln>
+              <a:solidFill>
+                <a:schemeClr val="accent4"/>
+              </a:solidFill>
+            </a:ln>
+          </p:spPr>
+          <p:style>
+            <a:lnRef idx="2">
+              <a:schemeClr val="accent4">
+                <a:shade val="50000"/>
+              </a:schemeClr>
+            </a:lnRef>
+            <a:fillRef idx="1">
+              <a:schemeClr val="accent4"/>
+            </a:fillRef>
+            <a:effectRef idx="0">
+              <a:schemeClr val="accent4"/>
+            </a:effectRef>
+            <a:fontRef idx="minor">
+              <a:schemeClr val="lt1"/>
+            </a:fontRef>
+          </p:style>
+          <p:txBody>
+            <a:bodyPr vert="horz" wrap="square" lIns="91440" tIns="45720" rIns="91440" bIns="45720" numCol="1" rtlCol="0" anchor="ctr" anchorCtr="0" compatLnSpc="1">
+              <a:prstTxWarp prst="textNoShape">
+                <a:avLst/>
+              </a:prstTxWarp>
+            </a:bodyPr>
+            <a:lstStyle/>
+            <a:p>
+              <a:pPr marL="0" marR="0" indent="0" algn="ctr" defTabSz="914400" rtl="0" eaLnBrk="0" fontAlgn="base" latinLnBrk="0" hangingPunct="0">
+                <a:lnSpc>
+                  <a:spcPct val="100000"/>
+                </a:lnSpc>
+                <a:spcBef>
+                  <a:spcPct val="0"/>
+                </a:spcBef>
+                <a:spcAft>
+                  <a:spcPct val="0"/>
+                </a:spcAft>
+                <a:buClrTx/>
+                <a:buSzTx/>
+                <a:buFontTx/>
+                <a:buNone/>
+                <a:tabLst/>
+              </a:pPr>
+              <a:endParaRPr kumimoji="0" lang="fr-FR" sz="1200" b="0" i="0" u="none" strike="noStrike" cap="none" normalizeH="0" baseline="0" dirty="0" smtClean="0">
+                <a:ln>
+                  <a:noFill/>
+                </a:ln>
+                <a:solidFill>
+                  <a:srgbClr val="00A2D8"/>
+                </a:solidFill>
+                <a:effectLst/>
+                <a:latin typeface="+mn-lt"/>
+              </a:endParaRPr>
+            </a:p>
+          </p:txBody>
+        </p:sp>
+      </p:grpSp>
+      <p:pic>
+        <p:nvPicPr>
+          <p:cNvPr id="81" name="Image 80" descr="20061.png"/>
+          <p:cNvPicPr>
+            <a:picLocks noChangeAspect="1"/>
+          </p:cNvPicPr>
+          <p:nvPr/>
+        </p:nvPicPr>
+        <p:blipFill>
+          <a:blip r:embed="rId4">
+            <a:extLst>
+              <a:ext uri="{28A0092B-C50C-407E-A947-70E740481C1C}">
+                <a14:useLocalDpi xmlns:a14="http://schemas.microsoft.com/office/drawing/2010/main" val="0"/>
+              </a:ext>
+            </a:extLst>
+          </a:blip>
+          <a:stretch>
+            <a:fillRect/>
+          </a:stretch>
+        </p:blipFill>
+        <p:spPr>
+          <a:xfrm>
+            <a:off x="1215548" y="4448368"/>
+            <a:ext cx="226864" cy="226864"/>
+          </a:xfrm>
+          <a:prstGeom prst="rect">
+            <a:avLst/>
+          </a:prstGeom>
+        </p:spPr>
+      </p:pic>
       <p:cxnSp>
         <p:nvCxnSpPr>
-          <p:cNvPr id="37" name="Connecteur droit avec flèche 36"/>
-          <p:cNvCxnSpPr/>
+          <p:cNvPr id="82" name="Connecteur droit avec flèche 81"/>
+          <p:cNvCxnSpPr>
+            <a:stCxn id="63" idx="3"/>
+          </p:cNvCxnSpPr>
           <p:nvPr/>
         </p:nvCxnSpPr>
         <p:spPr bwMode="auto">
           <a:xfrm>
-            <a:off x="2424315" y="3213094"/>
-            <a:ext cx="844165" cy="0"/>
+            <a:off x="2418306" y="2973109"/>
+            <a:ext cx="1524928" cy="0"/>
           </a:xfrm>
           <a:prstGeom prst="straightConnector1">
             <a:avLst/>
@@ -13071,21 +13026,17 @@
       </p:cxnSp>
       <p:cxnSp>
         <p:nvCxnSpPr>
-          <p:cNvPr id="42" name="Connecteur en arc 41"/>
-          <p:cNvCxnSpPr>
-            <a:stCxn id="29" idx="2"/>
-          </p:cNvCxnSpPr>
+          <p:cNvPr id="85" name="Connecteur droit avec flèche 84"/>
+          <p:cNvCxnSpPr/>
           <p:nvPr/>
         </p:nvCxnSpPr>
         <p:spPr bwMode="auto">
-          <a:xfrm rot="10800000" flipH="1">
-            <a:off x="3234658" y="2749255"/>
-            <a:ext cx="1251906" cy="378065"/>
-          </a:xfrm>
-          <a:prstGeom prst="curvedConnector3">
-            <a:avLst>
-              <a:gd name="adj1" fmla="val -57496"/>
-            </a:avLst>
+          <a:xfrm>
+            <a:off x="1710929" y="3934654"/>
+            <a:ext cx="2243645" cy="0"/>
+          </a:xfrm>
+          <a:prstGeom prst="straightConnector1">
+            <a:avLst/>
           </a:prstGeom>
           <a:ln>
             <a:headEnd type="none" w="med" len="med"/>
@@ -13107,10 +13058,456 @@
           </a:fontRef>
         </p:style>
       </p:cxnSp>
+      <p:cxnSp>
+        <p:nvCxnSpPr>
+          <p:cNvPr id="87" name="Connecteur droit avec flèche 86"/>
+          <p:cNvCxnSpPr>
+            <a:stCxn id="69" idx="3"/>
+          </p:cNvCxnSpPr>
+          <p:nvPr/>
+        </p:nvCxnSpPr>
+        <p:spPr bwMode="auto">
+          <a:xfrm>
+            <a:off x="3158214" y="4769880"/>
+            <a:ext cx="796360" cy="0"/>
+          </a:xfrm>
+          <a:prstGeom prst="straightConnector1">
+            <a:avLst/>
+          </a:prstGeom>
+          <a:ln>
+            <a:headEnd type="none" w="med" len="med"/>
+            <a:tailEnd type="arrow"/>
+          </a:ln>
+        </p:spPr>
+        <p:style>
+          <a:lnRef idx="1">
+            <a:schemeClr val="accent4"/>
+          </a:lnRef>
+          <a:fillRef idx="0">
+            <a:schemeClr val="accent4"/>
+          </a:fillRef>
+          <a:effectRef idx="0">
+            <a:schemeClr val="accent4"/>
+          </a:effectRef>
+          <a:fontRef idx="minor">
+            <a:schemeClr val="tx1"/>
+          </a:fontRef>
+        </p:style>
+      </p:cxnSp>
+      <p:cxnSp>
+        <p:nvCxnSpPr>
+          <p:cNvPr id="90" name="Connecteur droit avec flèche 89"/>
+          <p:cNvCxnSpPr>
+            <a:stCxn id="77" idx="3"/>
+          </p:cNvCxnSpPr>
+          <p:nvPr/>
+        </p:nvCxnSpPr>
+        <p:spPr bwMode="auto">
+          <a:xfrm>
+            <a:off x="1741417" y="5604569"/>
+            <a:ext cx="2201817" cy="0"/>
+          </a:xfrm>
+          <a:prstGeom prst="straightConnector1">
+            <a:avLst/>
+          </a:prstGeom>
+          <a:ln>
+            <a:headEnd type="none" w="med" len="med"/>
+            <a:tailEnd type="arrow"/>
+          </a:ln>
+        </p:spPr>
+        <p:style>
+          <a:lnRef idx="1">
+            <a:schemeClr val="accent4"/>
+          </a:lnRef>
+          <a:fillRef idx="0">
+            <a:schemeClr val="accent4"/>
+          </a:fillRef>
+          <a:effectRef idx="0">
+            <a:schemeClr val="accent4"/>
+          </a:effectRef>
+          <a:fontRef idx="minor">
+            <a:schemeClr val="tx1"/>
+          </a:fontRef>
+        </p:style>
+      </p:cxnSp>
+      <p:cxnSp>
+        <p:nvCxnSpPr>
+          <p:cNvPr id="95" name="Connecteur droit avec flèche 94"/>
+          <p:cNvCxnSpPr>
+            <a:endCxn id="11" idx="1"/>
+          </p:cNvCxnSpPr>
+          <p:nvPr/>
+        </p:nvCxnSpPr>
+        <p:spPr bwMode="auto">
+          <a:xfrm>
+            <a:off x="4159258" y="5721240"/>
+            <a:ext cx="543098" cy="0"/>
+          </a:xfrm>
+          <a:prstGeom prst="straightConnector1">
+            <a:avLst/>
+          </a:prstGeom>
+          <a:ln w="9525" cmpd="sng">
+            <a:headEnd type="none" w="med" len="med"/>
+            <a:tailEnd type="arrow"/>
+          </a:ln>
+          <a:effectLst/>
+        </p:spPr>
+        <p:style>
+          <a:lnRef idx="3">
+            <a:schemeClr val="accent6"/>
+          </a:lnRef>
+          <a:fillRef idx="0">
+            <a:schemeClr val="accent6"/>
+          </a:fillRef>
+          <a:effectRef idx="2">
+            <a:schemeClr val="accent6"/>
+          </a:effectRef>
+          <a:fontRef idx="minor">
+            <a:schemeClr val="tx1"/>
+          </a:fontRef>
+        </p:style>
+      </p:cxnSp>
+      <p:pic>
+        <p:nvPicPr>
+          <p:cNvPr id="99" name="Image 98" descr="MATRICES_5-normal-06.png"/>
+          <p:cNvPicPr>
+            <a:picLocks noChangeAspect="1"/>
+          </p:cNvPicPr>
+          <p:nvPr/>
+        </p:nvPicPr>
+        <p:blipFill>
+          <a:blip r:embed="rId6">
+            <a:extLst>
+              <a:ext uri="{28A0092B-C50C-407E-A947-70E740481C1C}">
+                <a14:useLocalDpi xmlns:a14="http://schemas.microsoft.com/office/drawing/2010/main" val="0"/>
+              </a:ext>
+            </a:extLst>
+          </a:blip>
+          <a:stretch>
+            <a:fillRect/>
+          </a:stretch>
+        </p:blipFill>
+        <p:spPr>
+          <a:xfrm>
+            <a:off x="5808380" y="5470380"/>
+            <a:ext cx="654686" cy="587106"/>
+          </a:xfrm>
+          <a:prstGeom prst="rect">
+            <a:avLst/>
+          </a:prstGeom>
+        </p:spPr>
+      </p:pic>
+      <p:pic>
+        <p:nvPicPr>
+          <p:cNvPr id="100" name="Image 99" descr="51541.png"/>
+          <p:cNvPicPr>
+            <a:picLocks noChangeAspect="1"/>
+          </p:cNvPicPr>
+          <p:nvPr/>
+        </p:nvPicPr>
+        <p:blipFill>
+          <a:blip r:embed="rId7">
+            <a:duotone>
+              <a:schemeClr val="accent2">
+                <a:shade val="45000"/>
+                <a:satMod val="135000"/>
+              </a:schemeClr>
+              <a:prstClr val="white"/>
+            </a:duotone>
+            <a:extLst>
+              <a:ext uri="{28A0092B-C50C-407E-A947-70E740481C1C}">
+                <a14:useLocalDpi xmlns:a14="http://schemas.microsoft.com/office/drawing/2010/main" val="0"/>
+              </a:ext>
+            </a:extLst>
+          </a:blip>
+          <a:stretch>
+            <a:fillRect/>
+          </a:stretch>
+        </p:blipFill>
+        <p:spPr>
+          <a:xfrm>
+            <a:off x="5862540" y="5541908"/>
+            <a:ext cx="521903" cy="360040"/>
+          </a:xfrm>
+          <a:prstGeom prst="rect">
+            <a:avLst/>
+          </a:prstGeom>
+        </p:spPr>
+      </p:pic>
+      <p:sp>
+        <p:nvSpPr>
+          <p:cNvPr id="104" name="ZoneTexte 103"/>
+          <p:cNvSpPr txBox="1"/>
+          <p:nvPr/>
+        </p:nvSpPr>
+        <p:spPr>
+          <a:xfrm>
+            <a:off x="2766157" y="2753636"/>
+            <a:ext cx="633707" cy="276999"/>
+          </a:xfrm>
+          <a:prstGeom prst="rect">
+            <a:avLst/>
+          </a:prstGeom>
+          <a:noFill/>
+        </p:spPr>
+        <p:txBody>
+          <a:bodyPr wrap="none" rtlCol="0">
+            <a:spAutoFit/>
+          </a:bodyPr>
+          <a:lstStyle/>
+          <a:p>
+            <a:r>
+              <a:rPr lang="fr-FR" sz="1200" dirty="0" smtClean="0">
+                <a:solidFill>
+                  <a:schemeClr val="tx2">
+                    <a:lumMod val="65000"/>
+                    <a:lumOff val="35000"/>
+                  </a:schemeClr>
+                </a:solidFill>
+              </a:rPr>
+              <a:t>id=xxx</a:t>
+            </a:r>
+            <a:endParaRPr lang="fr-FR" sz="1200" dirty="0" smtClean="0">
+              <a:solidFill>
+                <a:schemeClr val="tx2">
+                  <a:lumMod val="65000"/>
+                  <a:lumOff val="35000"/>
+                </a:schemeClr>
+              </a:solidFill>
+              <a:latin typeface="+mn-lt"/>
+            </a:endParaRPr>
+          </a:p>
+        </p:txBody>
+      </p:sp>
+      <p:sp>
+        <p:nvSpPr>
+          <p:cNvPr id="106" name="ZoneTexte 105"/>
+          <p:cNvSpPr txBox="1"/>
+          <p:nvPr/>
+        </p:nvSpPr>
+        <p:spPr>
+          <a:xfrm>
+            <a:off x="677008" y="4403008"/>
+            <a:ext cx="633707" cy="276999"/>
+          </a:xfrm>
+          <a:prstGeom prst="rect">
+            <a:avLst/>
+          </a:prstGeom>
+          <a:noFill/>
+        </p:spPr>
+        <p:txBody>
+          <a:bodyPr wrap="none" rtlCol="0">
+            <a:spAutoFit/>
+          </a:bodyPr>
+          <a:lstStyle/>
+          <a:p>
+            <a:r>
+              <a:rPr lang="fr-FR" sz="1200" dirty="0" smtClean="0">
+                <a:solidFill>
+                  <a:schemeClr val="tx2">
+                    <a:lumMod val="65000"/>
+                    <a:lumOff val="35000"/>
+                  </a:schemeClr>
+                </a:solidFill>
+              </a:rPr>
+              <a:t>id=xxx</a:t>
+            </a:r>
+            <a:endParaRPr lang="fr-FR" sz="1200" dirty="0" smtClean="0">
+              <a:solidFill>
+                <a:schemeClr val="tx2">
+                  <a:lumMod val="65000"/>
+                  <a:lumOff val="35000"/>
+                </a:schemeClr>
+              </a:solidFill>
+              <a:latin typeface="+mn-lt"/>
+            </a:endParaRPr>
+          </a:p>
+        </p:txBody>
+      </p:sp>
+      <p:sp>
+        <p:nvSpPr>
+          <p:cNvPr id="107" name="ZoneTexte 106"/>
+          <p:cNvSpPr txBox="1"/>
+          <p:nvPr/>
+        </p:nvSpPr>
+        <p:spPr>
+          <a:xfrm>
+            <a:off x="1958209" y="3716712"/>
+            <a:ext cx="633707" cy="276999"/>
+          </a:xfrm>
+          <a:prstGeom prst="rect">
+            <a:avLst/>
+          </a:prstGeom>
+          <a:noFill/>
+        </p:spPr>
+        <p:txBody>
+          <a:bodyPr wrap="none" rtlCol="0">
+            <a:spAutoFit/>
+          </a:bodyPr>
+          <a:lstStyle/>
+          <a:p>
+            <a:r>
+              <a:rPr lang="fr-FR" sz="1200" dirty="0" smtClean="0">
+                <a:solidFill>
+                  <a:schemeClr val="tx2">
+                    <a:lumMod val="65000"/>
+                    <a:lumOff val="35000"/>
+                  </a:schemeClr>
+                </a:solidFill>
+              </a:rPr>
+              <a:t>id=xxx</a:t>
+            </a:r>
+            <a:endParaRPr lang="fr-FR" sz="1200" dirty="0" smtClean="0">
+              <a:solidFill>
+                <a:schemeClr val="tx2">
+                  <a:lumMod val="65000"/>
+                  <a:lumOff val="35000"/>
+                </a:schemeClr>
+              </a:solidFill>
+              <a:latin typeface="+mn-lt"/>
+            </a:endParaRPr>
+          </a:p>
+        </p:txBody>
+      </p:sp>
+      <p:sp>
+        <p:nvSpPr>
+          <p:cNvPr id="108" name="ZoneTexte 107"/>
+          <p:cNvSpPr txBox="1"/>
+          <p:nvPr/>
+        </p:nvSpPr>
+        <p:spPr>
+          <a:xfrm>
+            <a:off x="3225165" y="4548072"/>
+            <a:ext cx="633707" cy="276999"/>
+          </a:xfrm>
+          <a:prstGeom prst="rect">
+            <a:avLst/>
+          </a:prstGeom>
+          <a:noFill/>
+        </p:spPr>
+        <p:txBody>
+          <a:bodyPr wrap="none" rtlCol="0">
+            <a:spAutoFit/>
+          </a:bodyPr>
+          <a:lstStyle/>
+          <a:p>
+            <a:r>
+              <a:rPr lang="fr-FR" sz="1200" dirty="0" smtClean="0">
+                <a:solidFill>
+                  <a:schemeClr val="tx2">
+                    <a:lumMod val="65000"/>
+                    <a:lumOff val="35000"/>
+                  </a:schemeClr>
+                </a:solidFill>
+              </a:rPr>
+              <a:t>id=xxx</a:t>
+            </a:r>
+            <a:endParaRPr lang="fr-FR" sz="1200" dirty="0" smtClean="0">
+              <a:solidFill>
+                <a:schemeClr val="tx2">
+                  <a:lumMod val="65000"/>
+                  <a:lumOff val="35000"/>
+                </a:schemeClr>
+              </a:solidFill>
+              <a:latin typeface="+mn-lt"/>
+            </a:endParaRPr>
+          </a:p>
+        </p:txBody>
+      </p:sp>
+      <p:sp>
+        <p:nvSpPr>
+          <p:cNvPr id="113" name="ZoneTexte 112"/>
+          <p:cNvSpPr txBox="1"/>
+          <p:nvPr/>
+        </p:nvSpPr>
+        <p:spPr>
+          <a:xfrm>
+            <a:off x="2851347" y="3256011"/>
+            <a:ext cx="633707" cy="276999"/>
+          </a:xfrm>
+          <a:prstGeom prst="rect">
+            <a:avLst/>
+          </a:prstGeom>
+          <a:noFill/>
+        </p:spPr>
+        <p:txBody>
+          <a:bodyPr wrap="none" rtlCol="0">
+            <a:spAutoFit/>
+          </a:bodyPr>
+          <a:lstStyle/>
+          <a:p>
+            <a:r>
+              <a:rPr lang="fr-FR" sz="1200" dirty="0" smtClean="0">
+                <a:solidFill>
+                  <a:schemeClr val="tx2">
+                    <a:lumMod val="65000"/>
+                    <a:lumOff val="35000"/>
+                  </a:schemeClr>
+                </a:solidFill>
+              </a:rPr>
+              <a:t>id=xxx</a:t>
+            </a:r>
+            <a:endParaRPr lang="fr-FR" sz="1200" dirty="0" smtClean="0">
+              <a:solidFill>
+                <a:schemeClr val="tx2">
+                  <a:lumMod val="65000"/>
+                  <a:lumOff val="35000"/>
+                </a:schemeClr>
+              </a:solidFill>
+              <a:latin typeface="+mn-lt"/>
+            </a:endParaRPr>
+          </a:p>
+        </p:txBody>
+      </p:sp>
+      <p:sp>
+        <p:nvSpPr>
+          <p:cNvPr id="114" name="ZoneTexte 113"/>
+          <p:cNvSpPr txBox="1"/>
+          <p:nvPr/>
+        </p:nvSpPr>
+        <p:spPr>
+          <a:xfrm>
+            <a:off x="1032507" y="2878651"/>
+            <a:ext cx="633707" cy="276999"/>
+          </a:xfrm>
+          <a:prstGeom prst="rect">
+            <a:avLst/>
+          </a:prstGeom>
+          <a:noFill/>
+        </p:spPr>
+        <p:txBody>
+          <a:bodyPr wrap="none" rtlCol="0">
+            <a:spAutoFit/>
+          </a:bodyPr>
+          <a:lstStyle/>
+          <a:p>
+            <a:r>
+              <a:rPr lang="fr-FR" sz="1200" dirty="0" smtClean="0">
+                <a:solidFill>
+                  <a:schemeClr val="tx2">
+                    <a:lumMod val="65000"/>
+                    <a:lumOff val="35000"/>
+                  </a:schemeClr>
+                </a:solidFill>
+              </a:rPr>
+              <a:t>id=xxx</a:t>
+            </a:r>
+            <a:endParaRPr lang="fr-FR" sz="1200" dirty="0" smtClean="0">
+              <a:solidFill>
+                <a:schemeClr val="tx2">
+                  <a:lumMod val="65000"/>
+                  <a:lumOff val="35000"/>
+                </a:schemeClr>
+              </a:solidFill>
+              <a:latin typeface="+mn-lt"/>
+            </a:endParaRPr>
+          </a:p>
+        </p:txBody>
+      </p:sp>
     </p:spTree>
     <p:extLst>
       <p:ext uri="{BB962C8B-B14F-4D97-AF65-F5344CB8AC3E}">
-        <p14:creationId xmlns:p14="http://schemas.microsoft.com/office/powerpoint/2010/main" val="1721269475"/>
+        <p14:creationId xmlns:p14="http://schemas.microsoft.com/office/powerpoint/2010/main" val="1141086599"/>
       </p:ext>
     </p:extLst>
   </p:cSld>
@@ -13128,1297 +13525,6 @@
 </file>
 
 <file path=ppt/slides/slide2.xml><?xml version="1.0" encoding="utf-8"?>
-<p:sld xmlns:a="http://schemas.openxmlformats.org/drawingml/2006/main" xmlns:r="http://schemas.openxmlformats.org/officeDocument/2006/relationships" xmlns:p="http://schemas.openxmlformats.org/presentationml/2006/main">
-  <p:cSld>
-    <p:spTree>
-      <p:nvGrpSpPr>
-        <p:cNvPr id="1" name=""/>
-        <p:cNvGrpSpPr/>
-        <p:nvPr/>
-      </p:nvGrpSpPr>
-      <p:grpSpPr>
-        <a:xfrm>
-          <a:off x="0" y="0"/>
-          <a:ext cx="0" cy="0"/>
-          <a:chOff x="0" y="0"/>
-          <a:chExt cx="0" cy="0"/>
-        </a:xfrm>
-      </p:grpSpPr>
-      <p:sp>
-        <p:nvSpPr>
-          <p:cNvPr id="3" name="Titre 2"/>
-          <p:cNvSpPr>
-            <a:spLocks noGrp="1"/>
-          </p:cNvSpPr>
-          <p:nvPr>
-            <p:ph type="title"/>
-          </p:nvPr>
-        </p:nvSpPr>
-        <p:spPr/>
-        <p:txBody>
-          <a:bodyPr/>
-          <a:lstStyle/>
-          <a:p>
-            <a:endParaRPr lang="fr-FR"/>
-          </a:p>
-        </p:txBody>
-      </p:sp>
-      <p:pic>
-        <p:nvPicPr>
-          <p:cNvPr id="4" name="Image 3" descr="MATRICES_4-normal-04.png"/>
-          <p:cNvPicPr>
-            <a:picLocks noChangeAspect="1"/>
-          </p:cNvPicPr>
-          <p:nvPr/>
-        </p:nvPicPr>
-        <p:blipFill>
-          <a:blip r:embed="rId2">
-            <a:extLst>
-              <a:ext uri="{28A0092B-C50C-407E-A947-70E740481C1C}">
-                <a14:useLocalDpi xmlns:a14="http://schemas.microsoft.com/office/drawing/2010/main" val="0"/>
-              </a:ext>
-            </a:extLst>
-          </a:blip>
-          <a:stretch>
-            <a:fillRect/>
-          </a:stretch>
-        </p:blipFill>
-        <p:spPr>
-          <a:xfrm>
-            <a:off x="1202297" y="2275083"/>
-            <a:ext cx="288032" cy="261197"/>
-          </a:xfrm>
-          <a:prstGeom prst="rect">
-            <a:avLst/>
-          </a:prstGeom>
-        </p:spPr>
-      </p:pic>
-      <p:pic>
-        <p:nvPicPr>
-          <p:cNvPr id="5" name="Image 4" descr="MATRICES_5-normal-06.png"/>
-          <p:cNvPicPr>
-            <a:picLocks noChangeAspect="1"/>
-          </p:cNvPicPr>
-          <p:nvPr/>
-        </p:nvPicPr>
-        <p:blipFill>
-          <a:blip r:embed="rId3">
-            <a:extLst>
-              <a:ext uri="{28A0092B-C50C-407E-A947-70E740481C1C}">
-                <a14:useLocalDpi xmlns:a14="http://schemas.microsoft.com/office/drawing/2010/main" val="0"/>
-              </a:ext>
-            </a:extLst>
-          </a:blip>
-          <a:stretch>
-            <a:fillRect/>
-          </a:stretch>
-        </p:blipFill>
-        <p:spPr>
-          <a:xfrm>
-            <a:off x="6307801" y="3305655"/>
-            <a:ext cx="654686" cy="587106"/>
-          </a:xfrm>
-          <a:prstGeom prst="rect">
-            <a:avLst/>
-          </a:prstGeom>
-        </p:spPr>
-      </p:pic>
-      <p:pic>
-        <p:nvPicPr>
-          <p:cNvPr id="6" name="Image 5" descr="UC-S2_Pos.png"/>
-          <p:cNvPicPr>
-            <a:picLocks noChangeAspect="1"/>
-          </p:cNvPicPr>
-          <p:nvPr/>
-        </p:nvPicPr>
-        <p:blipFill>
-          <a:blip r:embed="rId4">
-            <a:duotone>
-              <a:schemeClr val="bg2">
-                <a:shade val="45000"/>
-                <a:satMod val="135000"/>
-              </a:schemeClr>
-              <a:prstClr val="white"/>
-            </a:duotone>
-            <a:extLst>
-              <a:ext uri="{28A0092B-C50C-407E-A947-70E740481C1C}">
-                <a14:useLocalDpi xmlns:a14="http://schemas.microsoft.com/office/drawing/2010/main" val="0"/>
-              </a:ext>
-            </a:extLst>
-          </a:blip>
-          <a:stretch>
-            <a:fillRect/>
-          </a:stretch>
-        </p:blipFill>
-        <p:spPr>
-          <a:xfrm>
-            <a:off x="3953961" y="3198525"/>
-            <a:ext cx="475794" cy="813637"/>
-          </a:xfrm>
-          <a:prstGeom prst="rect">
-            <a:avLst/>
-          </a:prstGeom>
-        </p:spPr>
-      </p:pic>
-      <p:pic>
-        <p:nvPicPr>
-          <p:cNvPr id="9" name="Image 8" descr="11.png"/>
-          <p:cNvPicPr>
-            <a:picLocks noChangeAspect="1"/>
-          </p:cNvPicPr>
-          <p:nvPr/>
-        </p:nvPicPr>
-        <p:blipFill>
-          <a:blip r:embed="rId5">
-            <a:extLst>
-              <a:ext uri="{28A0092B-C50C-407E-A947-70E740481C1C}">
-                <a14:useLocalDpi xmlns:a14="http://schemas.microsoft.com/office/drawing/2010/main" val="0"/>
-              </a:ext>
-            </a:extLst>
-          </a:blip>
-          <a:stretch>
-            <a:fillRect/>
-          </a:stretch>
-        </p:blipFill>
-        <p:spPr>
-          <a:xfrm>
-            <a:off x="1130289" y="1843035"/>
-            <a:ext cx="539552" cy="514261"/>
-          </a:xfrm>
-          <a:prstGeom prst="rect">
-            <a:avLst/>
-          </a:prstGeom>
-        </p:spPr>
-      </p:pic>
-      <p:pic>
-        <p:nvPicPr>
-          <p:cNvPr id="10" name="Image 9" descr="11.png"/>
-          <p:cNvPicPr>
-            <a:picLocks noChangeAspect="1"/>
-          </p:cNvPicPr>
-          <p:nvPr/>
-        </p:nvPicPr>
-        <p:blipFill>
-          <a:blip r:embed="rId5">
-            <a:extLst>
-              <a:ext uri="{28A0092B-C50C-407E-A947-70E740481C1C}">
-                <a14:useLocalDpi xmlns:a14="http://schemas.microsoft.com/office/drawing/2010/main" val="0"/>
-              </a:ext>
-            </a:extLst>
-          </a:blip>
-          <a:stretch>
-            <a:fillRect/>
-          </a:stretch>
-        </p:blipFill>
-        <p:spPr>
-          <a:xfrm>
-            <a:off x="2282525" y="1834198"/>
-            <a:ext cx="539552" cy="514261"/>
-          </a:xfrm>
-          <a:prstGeom prst="rect">
-            <a:avLst/>
-          </a:prstGeom>
-        </p:spPr>
-      </p:pic>
-      <p:sp>
-        <p:nvSpPr>
-          <p:cNvPr id="19" name="ZoneTexte 18"/>
-          <p:cNvSpPr txBox="1"/>
-          <p:nvPr/>
-        </p:nvSpPr>
-        <p:spPr>
-          <a:xfrm>
-            <a:off x="4988196" y="2911342"/>
-            <a:ext cx="736099" cy="276999"/>
-          </a:xfrm>
-          <a:prstGeom prst="rect">
-            <a:avLst/>
-          </a:prstGeom>
-          <a:noFill/>
-        </p:spPr>
-        <p:txBody>
-          <a:bodyPr wrap="none" rtlCol="0">
-            <a:spAutoFit/>
-          </a:bodyPr>
-          <a:lstStyle/>
-          <a:p>
-            <a:pPr defTabSz="914400" eaLnBrk="0" fontAlgn="base" hangingPunct="0">
-              <a:spcBef>
-                <a:spcPct val="0"/>
-              </a:spcBef>
-              <a:spcAft>
-                <a:spcPct val="0"/>
-              </a:spcAft>
-            </a:pPr>
-            <a:r>
-              <a:rPr lang="fr-FR" sz="1200" dirty="0">
-                <a:solidFill>
-                  <a:srgbClr val="15AABE"/>
-                </a:solidFill>
-                <a:latin typeface="Arial"/>
-                <a:ea typeface="ＭＳ Ｐゴシック" pitchFamily="-104" charset="-128"/>
-              </a:rPr>
-              <a:t>No SQL</a:t>
-            </a:r>
-          </a:p>
-        </p:txBody>
-      </p:sp>
-      <p:pic>
-        <p:nvPicPr>
-          <p:cNvPr id="25" name="Image 24" descr="51541.png"/>
-          <p:cNvPicPr>
-            <a:picLocks noChangeAspect="1"/>
-          </p:cNvPicPr>
-          <p:nvPr/>
-        </p:nvPicPr>
-        <p:blipFill>
-          <a:blip r:embed="rId6">
-            <a:duotone>
-              <a:schemeClr val="accent1">
-                <a:shade val="45000"/>
-                <a:satMod val="135000"/>
-              </a:schemeClr>
-              <a:prstClr val="white"/>
-            </a:duotone>
-            <a:extLst>
-              <a:ext uri="{28A0092B-C50C-407E-A947-70E740481C1C}">
-                <a14:useLocalDpi xmlns:a14="http://schemas.microsoft.com/office/drawing/2010/main" val="0"/>
-              </a:ext>
-            </a:extLst>
-          </a:blip>
-          <a:stretch>
-            <a:fillRect/>
-          </a:stretch>
-        </p:blipFill>
-        <p:spPr>
-          <a:xfrm>
-            <a:off x="6361961" y="3377183"/>
-            <a:ext cx="521903" cy="360040"/>
-          </a:xfrm>
-          <a:prstGeom prst="rect">
-            <a:avLst/>
-          </a:prstGeom>
-        </p:spPr>
-      </p:pic>
-      <p:sp>
-        <p:nvSpPr>
-          <p:cNvPr id="27" name="ZoneTexte 26"/>
-          <p:cNvSpPr txBox="1"/>
-          <p:nvPr/>
-        </p:nvSpPr>
-        <p:spPr>
-          <a:xfrm>
-            <a:off x="6251690" y="3867378"/>
-            <a:ext cx="787357" cy="461665"/>
-          </a:xfrm>
-          <a:prstGeom prst="rect">
-            <a:avLst/>
-          </a:prstGeom>
-          <a:noFill/>
-        </p:spPr>
-        <p:txBody>
-          <a:bodyPr wrap="none" rtlCol="0">
-            <a:spAutoFit/>
-          </a:bodyPr>
-          <a:lstStyle/>
-          <a:p>
-            <a:pPr algn="ctr" defTabSz="914400" eaLnBrk="0" fontAlgn="base" hangingPunct="0">
-              <a:spcBef>
-                <a:spcPct val="0"/>
-              </a:spcBef>
-              <a:spcAft>
-                <a:spcPct val="0"/>
-              </a:spcAft>
-            </a:pPr>
-            <a:r>
-              <a:rPr lang="fr-FR" sz="1200" i="1" dirty="0" smtClean="0">
-                <a:solidFill>
-                  <a:srgbClr val="15AABE"/>
-                </a:solidFill>
-                <a:latin typeface="Arial"/>
-                <a:ea typeface="ＭＳ Ｐゴシック" pitchFamily="-104" charset="-128"/>
-              </a:rPr>
-              <a:t>BAM</a:t>
-            </a:r>
-          </a:p>
-          <a:p>
-            <a:pPr algn="ctr" defTabSz="914400" eaLnBrk="0" fontAlgn="base" hangingPunct="0">
-              <a:spcBef>
-                <a:spcPct val="0"/>
-              </a:spcBef>
-              <a:spcAft>
-                <a:spcPct val="0"/>
-              </a:spcAft>
-            </a:pPr>
-            <a:r>
-              <a:rPr lang="fr-FR" sz="1200" i="1" dirty="0" smtClean="0">
-                <a:solidFill>
-                  <a:srgbClr val="15AABE"/>
-                </a:solidFill>
-                <a:latin typeface="Arial"/>
-                <a:ea typeface="ＭＳ Ｐゴシック" pitchFamily="-104" charset="-128"/>
-              </a:rPr>
-              <a:t>Console</a:t>
-            </a:r>
-            <a:endParaRPr lang="fr-FR" sz="1200" i="1" dirty="0">
-              <a:solidFill>
-                <a:srgbClr val="15AABE"/>
-              </a:solidFill>
-              <a:latin typeface="Arial"/>
-              <a:ea typeface="ＭＳ Ｐゴシック" pitchFamily="-104" charset="-128"/>
-            </a:endParaRPr>
-          </a:p>
-        </p:txBody>
-      </p:sp>
-      <p:cxnSp>
-        <p:nvCxnSpPr>
-          <p:cNvPr id="28" name="Connecteur droit avec flèche 27"/>
-          <p:cNvCxnSpPr>
-            <a:stCxn id="117" idx="3"/>
-            <a:endCxn id="5" idx="1"/>
-          </p:cNvCxnSpPr>
-          <p:nvPr/>
-        </p:nvCxnSpPr>
-        <p:spPr bwMode="auto">
-          <a:xfrm>
-            <a:off x="5627535" y="3594046"/>
-            <a:ext cx="680266" cy="5162"/>
-          </a:xfrm>
-          <a:prstGeom prst="straightConnector1">
-            <a:avLst/>
-          </a:prstGeom>
-          <a:solidFill>
-            <a:schemeClr val="accent1"/>
-          </a:solidFill>
-          <a:ln w="9525" cap="flat" cmpd="sng" algn="ctr">
-            <a:solidFill>
-              <a:schemeClr val="accent6">
-                <a:lumMod val="90000"/>
-                <a:lumOff val="10000"/>
-              </a:schemeClr>
-            </a:solidFill>
-            <a:prstDash val="solid"/>
-            <a:round/>
-            <a:headEnd type="arrow"/>
-            <a:tailEnd type="arrow"/>
-          </a:ln>
-          <a:effectLst/>
-        </p:spPr>
-      </p:cxnSp>
-      <p:cxnSp>
-        <p:nvCxnSpPr>
-          <p:cNvPr id="29" name="Connecteur en angle 28"/>
-          <p:cNvCxnSpPr>
-            <a:stCxn id="110" idx="2"/>
-            <a:endCxn id="47" idx="2"/>
-          </p:cNvCxnSpPr>
-          <p:nvPr/>
-        </p:nvCxnSpPr>
-        <p:spPr bwMode="auto">
-          <a:xfrm rot="16200000" flipH="1">
-            <a:off x="2242475" y="2804078"/>
-            <a:ext cx="1056470" cy="551123"/>
-          </a:xfrm>
-          <a:prstGeom prst="bentConnector2">
-            <a:avLst/>
-          </a:prstGeom>
-          <a:ln w="9525" cmpd="sng">
-            <a:solidFill>
-              <a:schemeClr val="accent3"/>
-            </a:solidFill>
-            <a:headEnd type="none" w="med" len="med"/>
-            <a:tailEnd type="arrow"/>
-          </a:ln>
-          <a:effectLst/>
-        </p:spPr>
-        <p:style>
-          <a:lnRef idx="3">
-            <a:schemeClr val="accent6"/>
-          </a:lnRef>
-          <a:fillRef idx="0">
-            <a:schemeClr val="accent6"/>
-          </a:fillRef>
-          <a:effectRef idx="2">
-            <a:schemeClr val="accent6"/>
-          </a:effectRef>
-          <a:fontRef idx="minor">
-            <a:schemeClr val="tx1"/>
-          </a:fontRef>
-        </p:style>
-      </p:cxnSp>
-      <p:cxnSp>
-        <p:nvCxnSpPr>
-          <p:cNvPr id="35" name="Connecteur en angle 34"/>
-          <p:cNvCxnSpPr>
-            <a:stCxn id="4" idx="2"/>
-          </p:cNvCxnSpPr>
-          <p:nvPr/>
-        </p:nvCxnSpPr>
-        <p:spPr bwMode="auto">
-          <a:xfrm rot="16200000" flipH="1">
-            <a:off x="1594264" y="2288328"/>
-            <a:ext cx="1204058" cy="1699961"/>
-          </a:xfrm>
-          <a:prstGeom prst="bentConnector2">
-            <a:avLst/>
-          </a:prstGeom>
-          <a:ln w="9525" cmpd="sng">
-            <a:solidFill>
-              <a:srgbClr val="800000"/>
-            </a:solidFill>
-            <a:headEnd type="none" w="med" len="med"/>
-            <a:tailEnd type="arrow"/>
-          </a:ln>
-          <a:effectLst/>
-        </p:spPr>
-        <p:style>
-          <a:lnRef idx="3">
-            <a:schemeClr val="accent6"/>
-          </a:lnRef>
-          <a:fillRef idx="0">
-            <a:schemeClr val="accent6"/>
-          </a:fillRef>
-          <a:effectRef idx="2">
-            <a:schemeClr val="accent6"/>
-          </a:effectRef>
-          <a:fontRef idx="minor">
-            <a:schemeClr val="tx1"/>
-          </a:fontRef>
-        </p:style>
-      </p:cxnSp>
-      <p:sp>
-        <p:nvSpPr>
-          <p:cNvPr id="39" name="ZoneTexte 38"/>
-          <p:cNvSpPr txBox="1"/>
-          <p:nvPr/>
-        </p:nvSpPr>
-        <p:spPr>
-          <a:xfrm>
-            <a:off x="1259860" y="3720029"/>
-            <a:ext cx="573506" cy="276999"/>
-          </a:xfrm>
-          <a:prstGeom prst="rect">
-            <a:avLst/>
-          </a:prstGeom>
-          <a:noFill/>
-        </p:spPr>
-        <p:txBody>
-          <a:bodyPr wrap="none" rtlCol="0">
-            <a:spAutoFit/>
-          </a:bodyPr>
-          <a:lstStyle/>
-          <a:p>
-            <a:pPr defTabSz="914400" eaLnBrk="0" fontAlgn="base" hangingPunct="0">
-              <a:spcBef>
-                <a:spcPct val="0"/>
-              </a:spcBef>
-              <a:spcAft>
-                <a:spcPct val="0"/>
-              </a:spcAft>
-            </a:pPr>
-            <a:r>
-              <a:rPr lang="fr-FR" sz="1200" i="1" dirty="0" smtClean="0">
-                <a:solidFill>
-                  <a:srgbClr val="E63527">
-                    <a:lumMod val="75000"/>
-                  </a:srgbClr>
-                </a:solidFill>
-                <a:latin typeface="Arial"/>
-                <a:ea typeface="ＭＳ Ｐゴシック" pitchFamily="-104" charset="-128"/>
-              </a:rPr>
-              <a:t>Push</a:t>
-            </a:r>
-            <a:endParaRPr lang="fr-FR" sz="1200" i="1" dirty="0">
-              <a:solidFill>
-                <a:srgbClr val="E63527">
-                  <a:lumMod val="75000"/>
-                </a:srgbClr>
-              </a:solidFill>
-              <a:latin typeface="Arial"/>
-              <a:ea typeface="ＭＳ Ｐゴシック" pitchFamily="-104" charset="-128"/>
-            </a:endParaRPr>
-          </a:p>
-        </p:txBody>
-      </p:sp>
-      <p:pic>
-        <p:nvPicPr>
-          <p:cNvPr id="40" name="Image 39" descr="20061.png"/>
-          <p:cNvPicPr>
-            <a:picLocks noChangeAspect="1"/>
-          </p:cNvPicPr>
-          <p:nvPr/>
-        </p:nvPicPr>
-        <p:blipFill>
-          <a:blip r:embed="rId7">
-            <a:extLst>
-              <a:ext uri="{28A0092B-C50C-407E-A947-70E740481C1C}">
-                <a14:useLocalDpi xmlns:a14="http://schemas.microsoft.com/office/drawing/2010/main" val="0"/>
-              </a:ext>
-            </a:extLst>
-          </a:blip>
-          <a:stretch>
-            <a:fillRect/>
-          </a:stretch>
-        </p:blipFill>
-        <p:spPr>
-          <a:xfrm>
-            <a:off x="1719934" y="3770164"/>
-            <a:ext cx="226864" cy="226864"/>
-          </a:xfrm>
-          <a:prstGeom prst="rect">
-            <a:avLst/>
-          </a:prstGeom>
-        </p:spPr>
-      </p:pic>
-      <p:sp>
-        <p:nvSpPr>
-          <p:cNvPr id="41" name="ZoneTexte 40"/>
-          <p:cNvSpPr txBox="1"/>
-          <p:nvPr/>
-        </p:nvSpPr>
-        <p:spPr>
-          <a:xfrm>
-            <a:off x="3943137" y="2948890"/>
-            <a:ext cx="530676" cy="276999"/>
-          </a:xfrm>
-          <a:prstGeom prst="rect">
-            <a:avLst/>
-          </a:prstGeom>
-          <a:noFill/>
-        </p:spPr>
-        <p:txBody>
-          <a:bodyPr wrap="none" rtlCol="0">
-            <a:spAutoFit/>
-          </a:bodyPr>
-          <a:lstStyle/>
-          <a:p>
-            <a:pPr defTabSz="914400" eaLnBrk="0" fontAlgn="base" hangingPunct="0">
-              <a:spcBef>
-                <a:spcPct val="0"/>
-              </a:spcBef>
-              <a:spcAft>
-                <a:spcPct val="0"/>
-              </a:spcAft>
-            </a:pPr>
-            <a:r>
-              <a:rPr lang="fr-FR" sz="1200" i="1" dirty="0" smtClean="0">
-                <a:solidFill>
-                  <a:srgbClr val="15AABE"/>
-                </a:solidFill>
-                <a:latin typeface="Arial"/>
-                <a:ea typeface="ＭＳ Ｐゴシック" pitchFamily="-104" charset="-128"/>
-              </a:rPr>
-              <a:t>ESB</a:t>
-            </a:r>
-            <a:endParaRPr lang="fr-FR" sz="1200" i="1" dirty="0">
-              <a:solidFill>
-                <a:srgbClr val="15AABE"/>
-              </a:solidFill>
-              <a:latin typeface="Arial"/>
-              <a:ea typeface="ＭＳ Ｐゴシック" pitchFamily="-104" charset="-128"/>
-            </a:endParaRPr>
-          </a:p>
-        </p:txBody>
-      </p:sp>
-      <p:cxnSp>
-        <p:nvCxnSpPr>
-          <p:cNvPr id="43" name="Connecteur droit avec flèche 42"/>
-          <p:cNvCxnSpPr>
-            <a:stCxn id="6" idx="3"/>
-            <a:endCxn id="117" idx="1"/>
-          </p:cNvCxnSpPr>
-          <p:nvPr/>
-        </p:nvCxnSpPr>
-        <p:spPr bwMode="auto">
-          <a:xfrm flipV="1">
-            <a:off x="4429755" y="3594046"/>
-            <a:ext cx="681248" cy="11298"/>
-          </a:xfrm>
-          <a:prstGeom prst="straightConnector1">
-            <a:avLst/>
-          </a:prstGeom>
-          <a:ln>
-            <a:headEnd type="none" w="med" len="med"/>
-            <a:tailEnd type="arrow"/>
-          </a:ln>
-        </p:spPr>
-        <p:style>
-          <a:lnRef idx="1">
-            <a:schemeClr val="accent6"/>
-          </a:lnRef>
-          <a:fillRef idx="0">
-            <a:schemeClr val="accent6"/>
-          </a:fillRef>
-          <a:effectRef idx="0">
-            <a:schemeClr val="accent6"/>
-          </a:effectRef>
-          <a:fontRef idx="minor">
-            <a:schemeClr val="tx1"/>
-          </a:fontRef>
-        </p:style>
-      </p:cxnSp>
-      <p:sp>
-        <p:nvSpPr>
-          <p:cNvPr id="56" name="ZoneTexte 55"/>
-          <p:cNvSpPr txBox="1"/>
-          <p:nvPr/>
-        </p:nvSpPr>
-        <p:spPr>
-          <a:xfrm>
-            <a:off x="2490057" y="3286611"/>
-            <a:ext cx="479355" cy="276999"/>
-          </a:xfrm>
-          <a:prstGeom prst="rect">
-            <a:avLst/>
-          </a:prstGeom>
-          <a:noFill/>
-        </p:spPr>
-        <p:txBody>
-          <a:bodyPr wrap="none" rtlCol="0">
-            <a:spAutoFit/>
-          </a:bodyPr>
-          <a:lstStyle/>
-          <a:p>
-            <a:pPr defTabSz="914400" eaLnBrk="0" fontAlgn="base" hangingPunct="0">
-              <a:spcBef>
-                <a:spcPct val="0"/>
-              </a:spcBef>
-              <a:spcAft>
-                <a:spcPct val="0"/>
-              </a:spcAft>
-            </a:pPr>
-            <a:r>
-              <a:rPr lang="fr-FR" sz="1200" i="1" dirty="0">
-                <a:solidFill>
-                  <a:srgbClr val="78B755">
-                    <a:lumMod val="75000"/>
-                  </a:srgbClr>
-                </a:solidFill>
-                <a:latin typeface="Arial"/>
-                <a:ea typeface="ＭＳ Ｐゴシック" pitchFamily="-104" charset="-128"/>
-              </a:rPr>
-              <a:t>Pull</a:t>
-            </a:r>
-          </a:p>
-        </p:txBody>
-      </p:sp>
-      <p:sp>
-        <p:nvSpPr>
-          <p:cNvPr id="45" name="ZoneTexte 44"/>
-          <p:cNvSpPr txBox="1"/>
-          <p:nvPr/>
-        </p:nvSpPr>
-        <p:spPr>
-          <a:xfrm>
-            <a:off x="2857585" y="3807055"/>
-            <a:ext cx="684790" cy="276999"/>
-          </a:xfrm>
-          <a:prstGeom prst="rect">
-            <a:avLst/>
-          </a:prstGeom>
-          <a:noFill/>
-        </p:spPr>
-        <p:txBody>
-          <a:bodyPr wrap="none" rtlCol="0">
-            <a:spAutoFit/>
-          </a:bodyPr>
-          <a:lstStyle/>
-          <a:p>
-            <a:pPr defTabSz="914400" eaLnBrk="0" fontAlgn="base" hangingPunct="0">
-              <a:spcBef>
-                <a:spcPct val="0"/>
-              </a:spcBef>
-              <a:spcAft>
-                <a:spcPct val="0"/>
-              </a:spcAft>
-            </a:pPr>
-            <a:r>
-              <a:rPr lang="fr-FR" sz="1200" i="1" dirty="0" smtClean="0">
-                <a:solidFill>
-                  <a:schemeClr val="bg1">
-                    <a:lumMod val="65000"/>
-                  </a:schemeClr>
-                </a:solidFill>
-                <a:latin typeface="Arial"/>
-                <a:ea typeface="ＭＳ Ｐゴシック" pitchFamily="-104" charset="-128"/>
-              </a:rPr>
-              <a:t>Queue</a:t>
-            </a:r>
-            <a:endParaRPr lang="fr-FR" sz="1200" i="1" dirty="0">
-              <a:solidFill>
-                <a:schemeClr val="bg1">
-                  <a:lumMod val="65000"/>
-                </a:schemeClr>
-              </a:solidFill>
-              <a:latin typeface="Arial"/>
-              <a:ea typeface="ＭＳ Ｐゴシック" pitchFamily="-104" charset="-128"/>
-            </a:endParaRPr>
-          </a:p>
-        </p:txBody>
-      </p:sp>
-      <p:sp>
-        <p:nvSpPr>
-          <p:cNvPr id="47" name="Cylindre 46"/>
-          <p:cNvSpPr/>
-          <p:nvPr/>
-        </p:nvSpPr>
-        <p:spPr>
-          <a:xfrm>
-            <a:off x="3046272" y="3350801"/>
-            <a:ext cx="216024" cy="514147"/>
-          </a:xfrm>
-          <a:prstGeom prst="can">
-            <a:avLst/>
-          </a:prstGeom>
-          <a:solidFill>
-            <a:schemeClr val="accent1">
-              <a:lumMod val="75000"/>
-            </a:schemeClr>
-          </a:solidFill>
-          <a:ln/>
-        </p:spPr>
-        <p:style>
-          <a:lnRef idx="1">
-            <a:schemeClr val="accent6"/>
-          </a:lnRef>
-          <a:fillRef idx="3">
-            <a:schemeClr val="accent6"/>
-          </a:fillRef>
-          <a:effectRef idx="2">
-            <a:schemeClr val="accent6"/>
-          </a:effectRef>
-          <a:fontRef idx="minor">
-            <a:schemeClr val="lt1"/>
-          </a:fontRef>
-        </p:style>
-        <p:txBody>
-          <a:bodyPr vert="horz" wrap="square" lIns="91440" tIns="45720" rIns="91440" bIns="45720" numCol="1" rtlCol="0" anchor="ctr" anchorCtr="0" compatLnSpc="1">
-            <a:prstTxWarp prst="textNoShape">
-              <a:avLst/>
-            </a:prstTxWarp>
-          </a:bodyPr>
-          <a:lstStyle/>
-          <a:p>
-            <a:pPr algn="ctr" defTabSz="914400" eaLnBrk="0" fontAlgn="base" hangingPunct="0">
-              <a:spcBef>
-                <a:spcPct val="0"/>
-              </a:spcBef>
-              <a:spcAft>
-                <a:spcPct val="0"/>
-              </a:spcAft>
-            </a:pPr>
-            <a:endParaRPr lang="fr-FR" sz="1200" dirty="0">
-              <a:solidFill>
-                <a:srgbClr val="00A2D8"/>
-              </a:solidFill>
-              <a:latin typeface="Arial"/>
-            </a:endParaRPr>
-          </a:p>
-        </p:txBody>
-      </p:sp>
-      <p:sp>
-        <p:nvSpPr>
-          <p:cNvPr id="74" name="ZoneTexte 73"/>
-          <p:cNvSpPr txBox="1"/>
-          <p:nvPr/>
-        </p:nvSpPr>
-        <p:spPr>
-          <a:xfrm>
-            <a:off x="975674" y="1563762"/>
-            <a:ext cx="1052529" cy="276999"/>
-          </a:xfrm>
-          <a:prstGeom prst="rect">
-            <a:avLst/>
-          </a:prstGeom>
-          <a:noFill/>
-        </p:spPr>
-        <p:txBody>
-          <a:bodyPr wrap="none" rtlCol="0">
-            <a:spAutoFit/>
-          </a:bodyPr>
-          <a:lstStyle/>
-          <a:p>
-            <a:pPr defTabSz="914400" eaLnBrk="0" fontAlgn="base" hangingPunct="0">
-              <a:spcBef>
-                <a:spcPct val="0"/>
-              </a:spcBef>
-              <a:spcAft>
-                <a:spcPct val="0"/>
-              </a:spcAft>
-            </a:pPr>
-            <a:r>
-              <a:rPr lang="fr-FR" sz="1200" i="1" dirty="0" smtClean="0">
-                <a:solidFill>
-                  <a:srgbClr val="15AABE"/>
-                </a:solidFill>
-                <a:latin typeface="Arial"/>
-                <a:ea typeface="ＭＳ Ｐゴシック" pitchFamily="-104" charset="-128"/>
-              </a:rPr>
-              <a:t>Applications</a:t>
-            </a:r>
-            <a:endParaRPr lang="fr-FR" sz="1200" i="1" dirty="0">
-              <a:solidFill>
-                <a:srgbClr val="15AABE"/>
-              </a:solidFill>
-              <a:latin typeface="Arial"/>
-              <a:ea typeface="ＭＳ Ｐゴシック" pitchFamily="-104" charset="-128"/>
-            </a:endParaRPr>
-          </a:p>
-        </p:txBody>
-      </p:sp>
-      <p:cxnSp>
-        <p:nvCxnSpPr>
-          <p:cNvPr id="107" name="Connecteur droit avec flèche 106"/>
-          <p:cNvCxnSpPr>
-            <a:stCxn id="47" idx="4"/>
-            <a:endCxn id="6" idx="1"/>
-          </p:cNvCxnSpPr>
-          <p:nvPr/>
-        </p:nvCxnSpPr>
-        <p:spPr bwMode="auto">
-          <a:xfrm flipV="1">
-            <a:off x="3262296" y="3605344"/>
-            <a:ext cx="691665" cy="2531"/>
-          </a:xfrm>
-          <a:prstGeom prst="straightConnector1">
-            <a:avLst/>
-          </a:prstGeom>
-          <a:ln>
-            <a:headEnd type="none" w="med" len="med"/>
-            <a:tailEnd type="arrow"/>
-          </a:ln>
-        </p:spPr>
-        <p:style>
-          <a:lnRef idx="1">
-            <a:schemeClr val="accent6"/>
-          </a:lnRef>
-          <a:fillRef idx="0">
-            <a:schemeClr val="accent6"/>
-          </a:fillRef>
-          <a:effectRef idx="0">
-            <a:schemeClr val="accent6"/>
-          </a:effectRef>
-          <a:fontRef idx="minor">
-            <a:schemeClr val="tx1"/>
-          </a:fontRef>
-        </p:style>
-      </p:cxnSp>
-      <p:pic>
-        <p:nvPicPr>
-          <p:cNvPr id="110" name="Image 109"/>
-          <p:cNvPicPr>
-            <a:picLocks noChangeAspect="1"/>
-          </p:cNvPicPr>
-          <p:nvPr/>
-        </p:nvPicPr>
-        <p:blipFill>
-          <a:blip r:embed="rId8">
-            <a:duotone>
-              <a:schemeClr val="accent1">
-                <a:shade val="45000"/>
-                <a:satMod val="135000"/>
-              </a:schemeClr>
-              <a:prstClr val="white"/>
-            </a:duotone>
-          </a:blip>
-          <a:stretch>
-            <a:fillRect/>
-          </a:stretch>
-        </p:blipFill>
-        <p:spPr>
-          <a:xfrm>
-            <a:off x="2419613" y="2348992"/>
-            <a:ext cx="151072" cy="202413"/>
-          </a:xfrm>
-          <a:prstGeom prst="rect">
-            <a:avLst/>
-          </a:prstGeom>
-        </p:spPr>
-      </p:pic>
-      <p:pic>
-        <p:nvPicPr>
-          <p:cNvPr id="115" name="Image 114" descr="MATRICES_5-normal-01.png"/>
-          <p:cNvPicPr>
-            <a:picLocks noChangeAspect="1"/>
-          </p:cNvPicPr>
-          <p:nvPr/>
-        </p:nvPicPr>
-        <p:blipFill>
-          <a:blip r:embed="rId9">
-            <a:extLst>
-              <a:ext uri="{28A0092B-C50C-407E-A947-70E740481C1C}">
-                <a14:useLocalDpi xmlns:a14="http://schemas.microsoft.com/office/drawing/2010/main" val="0"/>
-              </a:ext>
-            </a:extLst>
-          </a:blip>
-          <a:stretch>
-            <a:fillRect/>
-          </a:stretch>
-        </p:blipFill>
-        <p:spPr>
-          <a:xfrm>
-            <a:off x="4246128" y="3740336"/>
-            <a:ext cx="367253" cy="367253"/>
-          </a:xfrm>
-          <a:prstGeom prst="rect">
-            <a:avLst/>
-          </a:prstGeom>
-        </p:spPr>
-      </p:pic>
-      <p:pic>
-        <p:nvPicPr>
-          <p:cNvPr id="117" name="Image 116" descr="UC-S2_Pos.png"/>
-          <p:cNvPicPr>
-            <a:picLocks noChangeAspect="1"/>
-          </p:cNvPicPr>
-          <p:nvPr/>
-        </p:nvPicPr>
-        <p:blipFill>
-          <a:blip r:embed="rId4">
-            <a:extLst>
-              <a:ext uri="{28A0092B-C50C-407E-A947-70E740481C1C}">
-                <a14:useLocalDpi xmlns:a14="http://schemas.microsoft.com/office/drawing/2010/main" val="0"/>
-              </a:ext>
-            </a:extLst>
-          </a:blip>
-          <a:stretch>
-            <a:fillRect/>
-          </a:stretch>
-        </p:blipFill>
-        <p:spPr>
-          <a:xfrm>
-            <a:off x="5111003" y="3152395"/>
-            <a:ext cx="516532" cy="883302"/>
-          </a:xfrm>
-          <a:prstGeom prst="rect">
-            <a:avLst/>
-          </a:prstGeom>
-        </p:spPr>
-      </p:pic>
-      <p:pic>
-        <p:nvPicPr>
-          <p:cNvPr id="118" name="Image 117" descr="NEW_3-Normal-Backlog.png"/>
-          <p:cNvPicPr>
-            <a:picLocks noChangeAspect="1"/>
-          </p:cNvPicPr>
-          <p:nvPr/>
-        </p:nvPicPr>
-        <p:blipFill>
-          <a:blip r:embed="rId10">
-            <a:extLst>
-              <a:ext uri="{28A0092B-C50C-407E-A947-70E740481C1C}">
-                <a14:useLocalDpi xmlns:a14="http://schemas.microsoft.com/office/drawing/2010/main" val="0"/>
-              </a:ext>
-            </a:extLst>
-          </a:blip>
-          <a:stretch>
-            <a:fillRect/>
-          </a:stretch>
-        </p:blipFill>
-        <p:spPr>
-          <a:xfrm>
-            <a:off x="5332286" y="3707809"/>
-            <a:ext cx="430040" cy="351851"/>
-          </a:xfrm>
-          <a:prstGeom prst="rect">
-            <a:avLst/>
-          </a:prstGeom>
-        </p:spPr>
-      </p:pic>
-      <p:cxnSp>
-        <p:nvCxnSpPr>
-          <p:cNvPr id="121" name="Connecteur droit avec flèche 120"/>
-          <p:cNvCxnSpPr>
-            <a:stCxn id="9" idx="3"/>
-            <a:endCxn id="10" idx="1"/>
-          </p:cNvCxnSpPr>
-          <p:nvPr/>
-        </p:nvCxnSpPr>
-        <p:spPr bwMode="auto">
-          <a:xfrm flipV="1">
-            <a:off x="1669841" y="2091329"/>
-            <a:ext cx="612684" cy="8837"/>
-          </a:xfrm>
-          <a:prstGeom prst="straightConnector1">
-            <a:avLst/>
-          </a:prstGeom>
-          <a:solidFill>
-            <a:schemeClr val="accent1"/>
-          </a:solidFill>
-          <a:ln w="9525" cap="flat" cmpd="sng" algn="ctr">
-            <a:solidFill>
-              <a:schemeClr val="accent6">
-                <a:lumMod val="90000"/>
-                <a:lumOff val="10000"/>
-              </a:schemeClr>
-            </a:solidFill>
-            <a:prstDash val="solid"/>
-            <a:round/>
-            <a:headEnd type="arrow"/>
-            <a:tailEnd type="arrow"/>
-          </a:ln>
-          <a:effectLst/>
-        </p:spPr>
-      </p:cxnSp>
-      <p:sp>
-        <p:nvSpPr>
-          <p:cNvPr id="126" name="ZoneTexte 125"/>
-          <p:cNvSpPr txBox="1"/>
-          <p:nvPr/>
-        </p:nvSpPr>
-        <p:spPr>
-          <a:xfrm>
-            <a:off x="2234976" y="1560205"/>
-            <a:ext cx="1052529" cy="276999"/>
-          </a:xfrm>
-          <a:prstGeom prst="rect">
-            <a:avLst/>
-          </a:prstGeom>
-          <a:noFill/>
-        </p:spPr>
-        <p:txBody>
-          <a:bodyPr wrap="none" rtlCol="0">
-            <a:spAutoFit/>
-          </a:bodyPr>
-          <a:lstStyle/>
-          <a:p>
-            <a:pPr defTabSz="914400" eaLnBrk="0" fontAlgn="base" hangingPunct="0">
-              <a:spcBef>
-                <a:spcPct val="0"/>
-              </a:spcBef>
-              <a:spcAft>
-                <a:spcPct val="0"/>
-              </a:spcAft>
-            </a:pPr>
-            <a:r>
-              <a:rPr lang="fr-FR" sz="1200" i="1" dirty="0" smtClean="0">
-                <a:solidFill>
-                  <a:srgbClr val="15AABE"/>
-                </a:solidFill>
-                <a:latin typeface="Arial"/>
-                <a:ea typeface="ＭＳ Ｐゴシック" pitchFamily="-104" charset="-128"/>
-              </a:rPr>
-              <a:t>Applications</a:t>
-            </a:r>
-            <a:endParaRPr lang="fr-FR" sz="1200" i="1" dirty="0">
-              <a:solidFill>
-                <a:srgbClr val="15AABE"/>
-              </a:solidFill>
-              <a:latin typeface="Arial"/>
-              <a:ea typeface="ＭＳ Ｐゴシック" pitchFamily="-104" charset="-128"/>
-            </a:endParaRPr>
-          </a:p>
-        </p:txBody>
-      </p:sp>
-      <p:cxnSp>
-        <p:nvCxnSpPr>
-          <p:cNvPr id="128" name="Connecteur en angle 127"/>
-          <p:cNvCxnSpPr>
-            <a:stCxn id="131" idx="2"/>
-            <a:endCxn id="47" idx="2"/>
-          </p:cNvCxnSpPr>
-          <p:nvPr/>
-        </p:nvCxnSpPr>
-        <p:spPr bwMode="auto">
-          <a:xfrm rot="16200000" flipH="1">
-            <a:off x="1763212" y="2324814"/>
-            <a:ext cx="1046943" cy="1519177"/>
-          </a:xfrm>
-          <a:prstGeom prst="bentConnector2">
-            <a:avLst/>
-          </a:prstGeom>
-          <a:ln w="9525" cmpd="sng">
-            <a:solidFill>
-              <a:schemeClr val="accent3"/>
-            </a:solidFill>
-            <a:headEnd type="none" w="med" len="med"/>
-            <a:tailEnd type="arrow"/>
-          </a:ln>
-          <a:effectLst/>
-        </p:spPr>
-        <p:style>
-          <a:lnRef idx="3">
-            <a:schemeClr val="accent6"/>
-          </a:lnRef>
-          <a:fillRef idx="0">
-            <a:schemeClr val="accent6"/>
-          </a:fillRef>
-          <a:effectRef idx="2">
-            <a:schemeClr val="accent6"/>
-          </a:effectRef>
-          <a:fontRef idx="minor">
-            <a:schemeClr val="tx1"/>
-          </a:fontRef>
-        </p:style>
-      </p:cxnSp>
-      <p:sp>
-        <p:nvSpPr>
-          <p:cNvPr id="129" name="ZoneTexte 128"/>
-          <p:cNvSpPr txBox="1"/>
-          <p:nvPr/>
-        </p:nvSpPr>
-        <p:spPr>
-          <a:xfrm>
-            <a:off x="1540156" y="3322726"/>
-            <a:ext cx="479355" cy="276999"/>
-          </a:xfrm>
-          <a:prstGeom prst="rect">
-            <a:avLst/>
-          </a:prstGeom>
-          <a:noFill/>
-        </p:spPr>
-        <p:txBody>
-          <a:bodyPr wrap="none" rtlCol="0">
-            <a:spAutoFit/>
-          </a:bodyPr>
-          <a:lstStyle/>
-          <a:p>
-            <a:pPr defTabSz="914400" eaLnBrk="0" fontAlgn="base" hangingPunct="0">
-              <a:spcBef>
-                <a:spcPct val="0"/>
-              </a:spcBef>
-              <a:spcAft>
-                <a:spcPct val="0"/>
-              </a:spcAft>
-            </a:pPr>
-            <a:r>
-              <a:rPr lang="fr-FR" sz="1200" i="1" dirty="0">
-                <a:solidFill>
-                  <a:srgbClr val="78B755">
-                    <a:lumMod val="75000"/>
-                  </a:srgbClr>
-                </a:solidFill>
-                <a:latin typeface="Arial"/>
-                <a:ea typeface="ＭＳ Ｐゴシック" pitchFamily="-104" charset="-128"/>
-              </a:rPr>
-              <a:t>Pull</a:t>
-            </a:r>
-          </a:p>
-        </p:txBody>
-      </p:sp>
-      <p:pic>
-        <p:nvPicPr>
-          <p:cNvPr id="131" name="Image 130"/>
-          <p:cNvPicPr>
-            <a:picLocks noChangeAspect="1"/>
-          </p:cNvPicPr>
-          <p:nvPr/>
-        </p:nvPicPr>
-        <p:blipFill>
-          <a:blip r:embed="rId8">
-            <a:duotone>
-              <a:schemeClr val="accent1">
-                <a:shade val="45000"/>
-                <a:satMod val="135000"/>
-              </a:schemeClr>
-              <a:prstClr val="white"/>
-            </a:duotone>
-          </a:blip>
-          <a:stretch>
-            <a:fillRect/>
-          </a:stretch>
-        </p:blipFill>
-        <p:spPr>
-          <a:xfrm>
-            <a:off x="1451559" y="2358519"/>
-            <a:ext cx="151072" cy="202413"/>
-          </a:xfrm>
-          <a:prstGeom prst="rect">
-            <a:avLst/>
-          </a:prstGeom>
-        </p:spPr>
-      </p:pic>
-      <p:cxnSp>
-        <p:nvCxnSpPr>
-          <p:cNvPr id="134" name="Connecteur en angle 133"/>
-          <p:cNvCxnSpPr/>
-          <p:nvPr/>
-        </p:nvCxnSpPr>
-        <p:spPr bwMode="auto">
-          <a:xfrm rot="16200000" flipH="1">
-            <a:off x="2026672" y="2700427"/>
-            <a:ext cx="1246932" cy="792275"/>
-          </a:xfrm>
-          <a:prstGeom prst="bentConnector3">
-            <a:avLst>
-              <a:gd name="adj1" fmla="val 96123"/>
-            </a:avLst>
-          </a:prstGeom>
-          <a:ln w="9525" cmpd="sng">
-            <a:solidFill>
-              <a:srgbClr val="800000"/>
-            </a:solidFill>
-            <a:headEnd type="none" w="med" len="med"/>
-            <a:tailEnd type="arrow"/>
-          </a:ln>
-          <a:effectLst/>
-        </p:spPr>
-        <p:style>
-          <a:lnRef idx="3">
-            <a:schemeClr val="accent6"/>
-          </a:lnRef>
-          <a:fillRef idx="0">
-            <a:schemeClr val="accent6"/>
-          </a:fillRef>
-          <a:effectRef idx="2">
-            <a:schemeClr val="accent6"/>
-          </a:effectRef>
-          <a:fontRef idx="minor">
-            <a:schemeClr val="tx1"/>
-          </a:fontRef>
-        </p:style>
-      </p:cxnSp>
-      <p:pic>
-        <p:nvPicPr>
-          <p:cNvPr id="135" name="Image 134" descr="MATRICES_4-normal-04.png"/>
-          <p:cNvPicPr>
-            <a:picLocks noChangeAspect="1"/>
-          </p:cNvPicPr>
-          <p:nvPr/>
-        </p:nvPicPr>
-        <p:blipFill>
-          <a:blip r:embed="rId2">
-            <a:extLst>
-              <a:ext uri="{28A0092B-C50C-407E-A947-70E740481C1C}">
-                <a14:useLocalDpi xmlns:a14="http://schemas.microsoft.com/office/drawing/2010/main" val="0"/>
-              </a:ext>
-            </a:extLst>
-          </a:blip>
-          <a:stretch>
-            <a:fillRect/>
-          </a:stretch>
-        </p:blipFill>
-        <p:spPr>
-          <a:xfrm>
-            <a:off x="2138509" y="2227920"/>
-            <a:ext cx="288032" cy="261197"/>
-          </a:xfrm>
-          <a:prstGeom prst="rect">
-            <a:avLst/>
-          </a:prstGeom>
-        </p:spPr>
-      </p:pic>
-    </p:spTree>
-    <p:extLst>
-      <p:ext uri="{BB962C8B-B14F-4D97-AF65-F5344CB8AC3E}">
-        <p14:creationId xmlns:p14="http://schemas.microsoft.com/office/powerpoint/2010/main" val="973895298"/>
-      </p:ext>
-    </p:extLst>
-  </p:cSld>
-  <p:clrMapOvr>
-    <a:masterClrMapping/>
-  </p:clrMapOvr>
-  <p:timing>
-    <p:tnLst>
-      <p:par>
-        <p:cTn xmlns:p14="http://schemas.microsoft.com/office/powerpoint/2010/main" id="1" dur="indefinite" restart="never" nodeType="tmRoot"/>
-      </p:par>
-    </p:tnLst>
-  </p:timing>
-</p:sld>
-</file>
-
-<file path=ppt/slides/slide3.xml><?xml version="1.0" encoding="utf-8"?>
 <p:sld xmlns:a="http://schemas.openxmlformats.org/drawingml/2006/main" xmlns:r="http://schemas.openxmlformats.org/officeDocument/2006/relationships" xmlns:p="http://schemas.openxmlformats.org/presentationml/2006/main">
   <p:cSld>
     <p:spTree>
@@ -15527,7 +14633,7 @@
 </p:sld>
 </file>
 
-<file path=ppt/slides/slide4.xml><?xml version="1.0" encoding="utf-8"?>
+<file path=ppt/slides/slide3.xml><?xml version="1.0" encoding="utf-8"?>
 <p:sld xmlns:a="http://schemas.openxmlformats.org/drawingml/2006/main" xmlns:r="http://schemas.openxmlformats.org/officeDocument/2006/relationships" xmlns:p="http://schemas.openxmlformats.org/presentationml/2006/main">
   <p:cSld>
     <p:spTree>
@@ -15566,7 +14672,7 @@
         </p:blipFill>
         <p:spPr>
           <a:xfrm>
-            <a:off x="5864908" y="3301607"/>
+            <a:off x="5263888" y="3301607"/>
             <a:ext cx="332323" cy="568293"/>
           </a:xfrm>
           <a:prstGeom prst="rect">
@@ -15615,7 +14721,7 @@
         </p:blipFill>
         <p:spPr>
           <a:xfrm>
-            <a:off x="1136864" y="2580886"/>
+            <a:off x="1465724" y="2580886"/>
             <a:ext cx="288032" cy="261197"/>
           </a:xfrm>
           <a:prstGeom prst="rect">
@@ -15645,7 +14751,7 @@
         </p:blipFill>
         <p:spPr>
           <a:xfrm>
-            <a:off x="1064856" y="2148838"/>
+            <a:off x="1393716" y="2148838"/>
             <a:ext cx="539552" cy="514261"/>
           </a:xfrm>
           <a:prstGeom prst="rect">
@@ -15675,7 +14781,7 @@
         </p:blipFill>
         <p:spPr>
           <a:xfrm>
-            <a:off x="2217092" y="2140001"/>
+            <a:off x="2545952" y="2140001"/>
             <a:ext cx="539552" cy="514261"/>
           </a:xfrm>
           <a:prstGeom prst="rect">
@@ -15693,7 +14799,7 @@
         </p:nvCxnSpPr>
         <p:spPr bwMode="auto">
           <a:xfrm rot="16200000" flipH="1">
-            <a:off x="2468525" y="2818398"/>
+            <a:off x="2797385" y="2818398"/>
             <a:ext cx="473507" cy="551125"/>
           </a:xfrm>
           <a:prstGeom prst="bentConnector2">
@@ -15729,7 +14835,7 @@
         </p:nvCxnSpPr>
         <p:spPr bwMode="auto">
           <a:xfrm rot="16200000" flipH="1">
-            <a:off x="1798427" y="2324535"/>
+            <a:off x="2127287" y="2324535"/>
             <a:ext cx="664866" cy="1699961"/>
           </a:xfrm>
           <a:prstGeom prst="bentConnector2">
@@ -15763,7 +14869,7 @@
         </p:nvSpPr>
         <p:spPr>
           <a:xfrm>
-            <a:off x="2980838" y="3117414"/>
+            <a:off x="3309698" y="3117414"/>
             <a:ext cx="241233" cy="1723175"/>
           </a:xfrm>
           <a:prstGeom prst="can">
@@ -15823,7 +14929,7 @@
         </p:nvSpPr>
         <p:spPr>
           <a:xfrm>
-            <a:off x="762099" y="1856866"/>
+            <a:off x="1090959" y="1856866"/>
             <a:ext cx="1052529" cy="276999"/>
           </a:xfrm>
           <a:prstGeom prst="rect">
@@ -15889,7 +14995,7 @@
         </p:blipFill>
         <p:spPr>
           <a:xfrm>
-            <a:off x="2354180" y="2654795"/>
+            <a:off x="2683040" y="2654795"/>
             <a:ext cx="151072" cy="202413"/>
           </a:xfrm>
           <a:prstGeom prst="rect">
@@ -15908,7 +15014,7 @@
         </p:nvCxnSpPr>
         <p:spPr bwMode="auto">
           <a:xfrm flipV="1">
-            <a:off x="1604408" y="2397132"/>
+            <a:off x="1933268" y="2397132"/>
             <a:ext cx="612684" cy="8837"/>
           </a:xfrm>
           <a:prstGeom prst="straightConnector1">
@@ -15940,7 +15046,7 @@
         </p:nvSpPr>
         <p:spPr>
           <a:xfrm>
-            <a:off x="2169543" y="1863002"/>
+            <a:off x="2498403" y="1863002"/>
             <a:ext cx="1052529" cy="276999"/>
           </a:xfrm>
           <a:prstGeom prst="rect">
@@ -15990,7 +15096,7 @@
         </p:nvSpPr>
         <p:spPr>
           <a:xfrm>
-            <a:off x="2823513" y="2816454"/>
+            <a:off x="3152373" y="2816454"/>
             <a:ext cx="616261" cy="276999"/>
           </a:xfrm>
           <a:prstGeom prst="rect">
@@ -16054,7 +15160,7 @@
         </p:blipFill>
         <p:spPr>
           <a:xfrm>
-            <a:off x="370689" y="2816454"/>
+            <a:off x="949029" y="2839134"/>
             <a:ext cx="539552" cy="514261"/>
           </a:xfrm>
           <a:prstGeom prst="rect">
@@ -16084,7 +15190,7 @@
         </p:blipFill>
         <p:spPr>
           <a:xfrm>
-            <a:off x="760608" y="3786963"/>
+            <a:off x="1089468" y="3786963"/>
             <a:ext cx="539552" cy="514261"/>
           </a:xfrm>
           <a:prstGeom prst="rect">
@@ -16114,7 +15220,7 @@
         </p:blipFill>
         <p:spPr>
           <a:xfrm>
-            <a:off x="1544852" y="2815499"/>
+            <a:off x="1873712" y="2815499"/>
             <a:ext cx="539552" cy="514261"/>
           </a:xfrm>
           <a:prstGeom prst="rect">
@@ -16130,7 +15236,7 @@
         </p:nvCxnSpPr>
         <p:spPr bwMode="auto">
           <a:xfrm>
-            <a:off x="1803055" y="3313456"/>
+            <a:off x="2131915" y="3313456"/>
             <a:ext cx="1177783" cy="473507"/>
           </a:xfrm>
           <a:prstGeom prst="bentConnector3">
@@ -16166,7 +15272,7 @@
         </p:nvCxnSpPr>
         <p:spPr bwMode="auto">
           <a:xfrm>
-            <a:off x="2028704" y="4558354"/>
+            <a:off x="2357564" y="4558354"/>
             <a:ext cx="952134" cy="126473"/>
           </a:xfrm>
           <a:prstGeom prst="bentConnector3">
@@ -16202,7 +15308,7 @@
         </p:nvCxnSpPr>
         <p:spPr bwMode="auto">
           <a:xfrm>
-            <a:off x="1010636" y="4301224"/>
+            <a:off x="1339496" y="4301224"/>
             <a:ext cx="1970205" cy="126473"/>
           </a:xfrm>
           <a:prstGeom prst="bentConnector3">
@@ -16252,7 +15358,7 @@
         </p:blipFill>
         <p:spPr>
           <a:xfrm>
-            <a:off x="1814628" y="4044093"/>
+            <a:off x="2143488" y="4044093"/>
             <a:ext cx="539552" cy="514261"/>
           </a:xfrm>
           <a:prstGeom prst="rect">
@@ -16270,8 +15376,8 @@
         </p:nvCxnSpPr>
         <p:spPr bwMode="auto">
           <a:xfrm rot="16200000" flipH="1">
-            <a:off x="1636825" y="2334354"/>
-            <a:ext cx="347653" cy="2340373"/>
+            <a:off x="2119656" y="2452543"/>
+            <a:ext cx="289191" cy="2090893"/>
           </a:xfrm>
           <a:prstGeom prst="bentConnector2">
             <a:avLst/>
@@ -16470,8 +15576,8 @@
         </p:nvCxnSpPr>
         <p:spPr bwMode="auto">
           <a:xfrm>
-            <a:off x="3222071" y="3979002"/>
-            <a:ext cx="734138" cy="14554"/>
+            <a:off x="3550931" y="3979002"/>
+            <a:ext cx="405278" cy="14554"/>
           </a:xfrm>
           <a:prstGeom prst="straightConnector1">
             <a:avLst/>
@@ -16507,8 +15613,8 @@
         </p:nvCxnSpPr>
         <p:spPr bwMode="auto">
           <a:xfrm flipV="1">
-            <a:off x="3222071" y="3628166"/>
-            <a:ext cx="1104491" cy="350836"/>
+            <a:off x="3550931" y="3628166"/>
+            <a:ext cx="775631" cy="350836"/>
           </a:xfrm>
           <a:prstGeom prst="straightConnector1">
             <a:avLst/>
@@ -16544,8 +15650,8 @@
         </p:nvCxnSpPr>
         <p:spPr bwMode="auto">
           <a:xfrm>
-            <a:off x="3222071" y="3979002"/>
-            <a:ext cx="1104490" cy="371935"/>
+            <a:off x="3550931" y="3979002"/>
+            <a:ext cx="775630" cy="371935"/>
           </a:xfrm>
           <a:prstGeom prst="straightConnector1">
             <a:avLst/>
@@ -16592,7 +15698,7 @@
         </p:blipFill>
         <p:spPr>
           <a:xfrm>
-            <a:off x="6270794" y="4678562"/>
+            <a:off x="5669774" y="4678562"/>
             <a:ext cx="332323" cy="568293"/>
           </a:xfrm>
           <a:prstGeom prst="rect">
@@ -16622,7 +15728,7 @@
         </p:blipFill>
         <p:spPr>
           <a:xfrm>
-            <a:off x="5864908" y="5026216"/>
+            <a:off x="5263888" y="5026216"/>
             <a:ext cx="332323" cy="568293"/>
           </a:xfrm>
           <a:prstGeom prst="rect">
@@ -16652,7 +15758,7 @@
         </p:blipFill>
         <p:spPr>
           <a:xfrm>
-            <a:off x="6356071" y="5364925"/>
+            <a:off x="5755051" y="5364925"/>
             <a:ext cx="332323" cy="568293"/>
           </a:xfrm>
           <a:prstGeom prst="rect">
@@ -16682,7 +15788,7 @@
         </p:blipFill>
         <p:spPr>
           <a:xfrm>
-            <a:off x="6777821" y="4962708"/>
+            <a:off x="6176801" y="4962708"/>
             <a:ext cx="332323" cy="568293"/>
           </a:xfrm>
           <a:prstGeom prst="rect">
@@ -16690,203 +15796,6 @@
           </a:prstGeom>
         </p:spPr>
       </p:pic>
-      <p:sp>
-        <p:nvSpPr>
-          <p:cNvPr id="56" name="ZoneTexte 55"/>
-          <p:cNvSpPr txBox="1"/>
-          <p:nvPr/>
-        </p:nvSpPr>
-        <p:spPr>
-          <a:xfrm>
-            <a:off x="7515070" y="5134092"/>
-            <a:ext cx="1223412" cy="461665"/>
-          </a:xfrm>
-          <a:prstGeom prst="rect">
-            <a:avLst/>
-          </a:prstGeom>
-          <a:noFill/>
-        </p:spPr>
-        <p:txBody>
-          <a:bodyPr wrap="none" rtlCol="0">
-            <a:spAutoFit/>
-          </a:bodyPr>
-          <a:lstStyle/>
-          <a:p>
-            <a:pPr defTabSz="914400" eaLnBrk="0" fontAlgn="base" hangingPunct="0">
-              <a:spcBef>
-                <a:spcPct val="0"/>
-              </a:spcBef>
-              <a:spcAft>
-                <a:spcPct val="0"/>
-              </a:spcAft>
-            </a:pPr>
-            <a:r>
-              <a:rPr lang="fr-FR" sz="1200" dirty="0" smtClean="0">
-                <a:solidFill>
-                  <a:srgbClr val="15AABE"/>
-                </a:solidFill>
-                <a:latin typeface="Arial"/>
-                <a:ea typeface="ＭＳ Ｐゴシック" pitchFamily="-104" charset="-128"/>
-              </a:rPr>
-              <a:t>Cluster </a:t>
-            </a:r>
-            <a:r>
-              <a:rPr lang="fr-FR" sz="1200" dirty="0" err="1" smtClean="0">
-                <a:solidFill>
-                  <a:srgbClr val="15AABE"/>
-                </a:solidFill>
-                <a:latin typeface="Arial"/>
-                <a:ea typeface="ＭＳ Ｐゴシック" pitchFamily="-104" charset="-128"/>
-              </a:rPr>
-              <a:t>NoSQL</a:t>
-            </a:r>
-            <a:r>
-              <a:rPr lang="fr-FR" sz="1200" dirty="0">
-                <a:solidFill>
-                  <a:srgbClr val="15AABE"/>
-                </a:solidFill>
-                <a:latin typeface="Arial"/>
-                <a:ea typeface="ＭＳ Ｐゴシック" pitchFamily="-104" charset="-128"/>
-              </a:rPr>
-              <a:t> </a:t>
-            </a:r>
-            <a:endParaRPr lang="fr-FR" sz="1200" dirty="0" smtClean="0">
-              <a:solidFill>
-                <a:srgbClr val="15AABE"/>
-              </a:solidFill>
-              <a:latin typeface="Arial"/>
-              <a:ea typeface="ＭＳ Ｐゴシック" pitchFamily="-104" charset="-128"/>
-            </a:endParaRPr>
-          </a:p>
-          <a:p>
-            <a:pPr defTabSz="914400" eaLnBrk="0" fontAlgn="base" hangingPunct="0">
-              <a:spcBef>
-                <a:spcPct val="0"/>
-              </a:spcBef>
-              <a:spcAft>
-                <a:spcPct val="0"/>
-              </a:spcAft>
-            </a:pPr>
-            <a:r>
-              <a:rPr lang="fr-FR" sz="1200" dirty="0" smtClean="0">
-                <a:solidFill>
-                  <a:srgbClr val="15AABE"/>
-                </a:solidFill>
-                <a:latin typeface="Arial"/>
-                <a:ea typeface="ＭＳ Ｐゴシック" pitchFamily="-104" charset="-128"/>
-              </a:rPr>
-              <a:t>(indexation)</a:t>
-            </a:r>
-            <a:endParaRPr lang="fr-FR" sz="1200" dirty="0">
-              <a:solidFill>
-                <a:srgbClr val="15AABE"/>
-              </a:solidFill>
-              <a:latin typeface="Arial"/>
-              <a:ea typeface="ＭＳ Ｐゴシック" pitchFamily="-104" charset="-128"/>
-            </a:endParaRPr>
-          </a:p>
-        </p:txBody>
-      </p:sp>
-      <p:sp>
-        <p:nvSpPr>
-          <p:cNvPr id="61" name="ZoneTexte 60"/>
-          <p:cNvSpPr txBox="1"/>
-          <p:nvPr/>
-        </p:nvSpPr>
-        <p:spPr>
-          <a:xfrm>
-            <a:off x="7515070" y="3233263"/>
-            <a:ext cx="1364476" cy="461665"/>
-          </a:xfrm>
-          <a:prstGeom prst="rect">
-            <a:avLst/>
-          </a:prstGeom>
-          <a:noFill/>
-        </p:spPr>
-        <p:txBody>
-          <a:bodyPr wrap="none" rtlCol="0">
-            <a:spAutoFit/>
-          </a:bodyPr>
-          <a:lstStyle/>
-          <a:p>
-            <a:pPr defTabSz="914400" eaLnBrk="0" fontAlgn="base" hangingPunct="0">
-              <a:spcBef>
-                <a:spcPct val="0"/>
-              </a:spcBef>
-              <a:spcAft>
-                <a:spcPct val="0"/>
-              </a:spcAft>
-            </a:pPr>
-            <a:r>
-              <a:rPr lang="fr-FR" sz="1200" dirty="0" smtClean="0">
-                <a:solidFill>
-                  <a:srgbClr val="15AABE"/>
-                </a:solidFill>
-                <a:latin typeface="Arial"/>
-                <a:ea typeface="ＭＳ Ｐゴシック" pitchFamily="-104" charset="-128"/>
-              </a:rPr>
-              <a:t>Cluster </a:t>
-            </a:r>
-            <a:r>
-              <a:rPr lang="fr-FR" sz="1200" dirty="0" err="1" smtClean="0">
-                <a:solidFill>
-                  <a:srgbClr val="15AABE"/>
-                </a:solidFill>
-                <a:latin typeface="Arial"/>
-                <a:ea typeface="ＭＳ Ｐゴシック" pitchFamily="-104" charset="-128"/>
-              </a:rPr>
-              <a:t>Big</a:t>
-            </a:r>
-            <a:r>
-              <a:rPr lang="fr-FR" sz="1200" dirty="0" smtClean="0">
-                <a:solidFill>
-                  <a:srgbClr val="15AABE"/>
-                </a:solidFill>
-                <a:latin typeface="Arial"/>
-                <a:ea typeface="ＭＳ Ｐゴシック" pitchFamily="-104" charset="-128"/>
-              </a:rPr>
-              <a:t> </a:t>
-            </a:r>
-            <a:r>
-              <a:rPr lang="fr-FR" sz="1200" dirty="0" smtClean="0">
-                <a:solidFill>
-                  <a:srgbClr val="15AABE"/>
-                </a:solidFill>
-                <a:latin typeface="Arial"/>
-                <a:ea typeface="ＭＳ Ｐゴシック" pitchFamily="-104" charset="-128"/>
-              </a:rPr>
-              <a:t>DATA</a:t>
-            </a:r>
-          </a:p>
-          <a:p>
-            <a:pPr defTabSz="914400" eaLnBrk="0" fontAlgn="base" hangingPunct="0">
-              <a:spcBef>
-                <a:spcPct val="0"/>
-              </a:spcBef>
-              <a:spcAft>
-                <a:spcPct val="0"/>
-              </a:spcAft>
-            </a:pPr>
-            <a:r>
-              <a:rPr lang="fr-FR" sz="1200" dirty="0" smtClean="0">
-                <a:solidFill>
-                  <a:srgbClr val="15AABE"/>
-                </a:solidFill>
-                <a:latin typeface="Arial"/>
-                <a:ea typeface="ＭＳ Ｐゴシック" pitchFamily="-104" charset="-128"/>
-              </a:rPr>
-              <a:t>(stockage)</a:t>
-            </a:r>
-            <a:endParaRPr lang="fr-FR" sz="1200" dirty="0">
-              <a:solidFill>
-                <a:srgbClr val="15AABE"/>
-              </a:solidFill>
-              <a:latin typeface="Arial"/>
-              <a:ea typeface="ＭＳ Ｐゴシック" pitchFamily="-104" charset="-128"/>
-            </a:endParaRPr>
-          </a:p>
-        </p:txBody>
-      </p:sp>
       <p:cxnSp>
         <p:nvCxnSpPr>
           <p:cNvPr id="63" name="Connecteur droit avec flèche 62"/>
@@ -16899,7 +15808,7 @@
         <p:spPr bwMode="auto">
           <a:xfrm>
             <a:off x="4566680" y="3628166"/>
-            <a:ext cx="1298228" cy="1682197"/>
+            <a:ext cx="697208" cy="1682197"/>
           </a:xfrm>
           <a:prstGeom prst="straightConnector1">
             <a:avLst/>
@@ -16934,8 +15843,8 @@
         </p:nvCxnSpPr>
         <p:spPr bwMode="auto">
           <a:xfrm flipV="1">
-            <a:off x="4566680" y="3600879"/>
-            <a:ext cx="1302032" cy="27287"/>
+            <a:off x="4566680" y="3600880"/>
+            <a:ext cx="701012" cy="27286"/>
           </a:xfrm>
           <a:prstGeom prst="straightConnector1">
             <a:avLst/>
@@ -16982,7 +15891,7 @@
         </p:blipFill>
         <p:spPr>
           <a:xfrm>
-            <a:off x="5982583" y="5415824"/>
+            <a:off x="5381563" y="5415824"/>
             <a:ext cx="274516" cy="224604"/>
           </a:xfrm>
           <a:prstGeom prst="rect">
@@ -17012,7 +15921,7 @@
         </p:blipFill>
         <p:spPr>
           <a:xfrm>
-            <a:off x="6418597" y="5049732"/>
+            <a:off x="5817577" y="5049732"/>
             <a:ext cx="274516" cy="224604"/>
           </a:xfrm>
           <a:prstGeom prst="rect">
@@ -17042,7 +15951,7 @@
         </p:blipFill>
         <p:spPr>
           <a:xfrm>
-            <a:off x="6972886" y="5364925"/>
+            <a:off x="6371866" y="5364925"/>
             <a:ext cx="274516" cy="224604"/>
           </a:xfrm>
           <a:prstGeom prst="rect">
@@ -17072,7 +15981,7 @@
         </p:blipFill>
         <p:spPr>
           <a:xfrm>
-            <a:off x="6503305" y="5776238"/>
+            <a:off x="5902285" y="5776238"/>
             <a:ext cx="274516" cy="224604"/>
           </a:xfrm>
           <a:prstGeom prst="rect">
@@ -17088,7 +15997,7 @@
         </p:nvSpPr>
         <p:spPr>
           <a:xfrm>
-            <a:off x="5535936" y="4631298"/>
+            <a:off x="4934916" y="4631298"/>
             <a:ext cx="1899182" cy="1466704"/>
           </a:xfrm>
           <a:prstGeom prst="ellipse">
@@ -17147,7 +16056,7 @@
         </p:nvSpPr>
         <p:spPr>
           <a:xfrm>
-            <a:off x="5518158" y="2773597"/>
+            <a:off x="4917138" y="2773597"/>
             <a:ext cx="1899182" cy="1466704"/>
           </a:xfrm>
           <a:prstGeom prst="ellipse">
@@ -17206,8 +16115,8 @@
         </p:nvSpPr>
         <p:spPr>
           <a:xfrm>
-            <a:off x="3376970" y="3244993"/>
-            <a:ext cx="1899182" cy="1649962"/>
+            <a:off x="3696722" y="3244993"/>
+            <a:ext cx="1122624" cy="1649962"/>
           </a:xfrm>
           <a:prstGeom prst="ellipse">
             <a:avLst/>
@@ -17265,7 +16174,7 @@
         </p:nvSpPr>
         <p:spPr>
           <a:xfrm>
-            <a:off x="5518158" y="855905"/>
+            <a:off x="4917138" y="855905"/>
             <a:ext cx="1899182" cy="1466704"/>
           </a:xfrm>
           <a:prstGeom prst="ellipse">
@@ -17332,7 +16241,7 @@
         </p:blipFill>
         <p:spPr>
           <a:xfrm>
-            <a:off x="6043981" y="3642586"/>
+            <a:off x="5442961" y="3642586"/>
             <a:ext cx="285306" cy="301230"/>
           </a:xfrm>
           <a:prstGeom prst="rect">
@@ -17352,7 +16261,7 @@
         <p:spPr bwMode="auto">
           <a:xfrm flipV="1">
             <a:off x="4566680" y="1916612"/>
-            <a:ext cx="1724340" cy="1711554"/>
+            <a:ext cx="1123320" cy="1711554"/>
           </a:xfrm>
           <a:prstGeom prst="straightConnector1">
             <a:avLst/>
@@ -17388,7 +16297,7 @@
         </p:nvCxnSpPr>
         <p:spPr bwMode="auto">
           <a:xfrm>
-            <a:off x="6457182" y="2200758"/>
+            <a:off x="5856162" y="2200758"/>
             <a:ext cx="0" cy="615696"/>
           </a:xfrm>
           <a:prstGeom prst="straightConnector1">
@@ -17414,95 +16323,6 @@
           </a:fontRef>
         </p:style>
       </p:cxnSp>
-      <p:sp>
-        <p:nvSpPr>
-          <p:cNvPr id="90" name="ZoneTexte 89"/>
-          <p:cNvSpPr txBox="1"/>
-          <p:nvPr/>
-        </p:nvSpPr>
-        <p:spPr>
-          <a:xfrm>
-            <a:off x="7448461" y="1393925"/>
-            <a:ext cx="1356636" cy="461665"/>
-          </a:xfrm>
-          <a:prstGeom prst="rect">
-            <a:avLst/>
-          </a:prstGeom>
-          <a:noFill/>
-        </p:spPr>
-        <p:txBody>
-          <a:bodyPr wrap="none" rtlCol="0">
-            <a:spAutoFit/>
-          </a:bodyPr>
-          <a:lstStyle/>
-          <a:p>
-            <a:pPr defTabSz="914400" eaLnBrk="0" fontAlgn="base" hangingPunct="0">
-              <a:spcBef>
-                <a:spcPct val="0"/>
-              </a:spcBef>
-              <a:spcAft>
-                <a:spcPct val="0"/>
-              </a:spcAft>
-            </a:pPr>
-            <a:r>
-              <a:rPr lang="fr-FR" sz="1200" dirty="0" smtClean="0">
-                <a:solidFill>
-                  <a:srgbClr val="15AABE"/>
-                </a:solidFill>
-                <a:latin typeface="Arial"/>
-                <a:ea typeface="ＭＳ Ｐゴシック" pitchFamily="-104" charset="-128"/>
-              </a:rPr>
-              <a:t>Cluster </a:t>
-            </a:r>
-            <a:r>
-              <a:rPr lang="fr-FR" sz="1200" dirty="0" smtClean="0">
-                <a:solidFill>
-                  <a:srgbClr val="15AABE"/>
-                </a:solidFill>
-                <a:latin typeface="Arial"/>
-                <a:ea typeface="ＭＳ Ｐゴシック" pitchFamily="-104" charset="-128"/>
-              </a:rPr>
-              <a:t/>
-            </a:r>
-            <a:br>
-              <a:rPr lang="fr-FR" sz="1200" dirty="0" smtClean="0">
-                <a:solidFill>
-                  <a:srgbClr val="15AABE"/>
-                </a:solidFill>
-                <a:latin typeface="Arial"/>
-                <a:ea typeface="ＭＳ Ｐゴシック" pitchFamily="-104" charset="-128"/>
-              </a:rPr>
-            </a:br>
-            <a:r>
-              <a:rPr lang="fr-FR" sz="1200" dirty="0" smtClean="0">
-                <a:solidFill>
-                  <a:srgbClr val="15AABE"/>
-                </a:solidFill>
-                <a:latin typeface="Arial"/>
-                <a:ea typeface="ＭＳ Ｐゴシック" pitchFamily="-104" charset="-128"/>
-              </a:rPr>
-              <a:t>machine </a:t>
-            </a:r>
-            <a:r>
-              <a:rPr lang="fr-FR" sz="1200" dirty="0" err="1" smtClean="0">
-                <a:solidFill>
-                  <a:srgbClr val="15AABE"/>
-                </a:solidFill>
-                <a:latin typeface="Arial"/>
-                <a:ea typeface="ＭＳ Ｐゴシック" pitchFamily="-104" charset="-128"/>
-              </a:rPr>
-              <a:t>learning</a:t>
-            </a:r>
-            <a:endParaRPr lang="fr-FR" sz="1200" dirty="0">
-              <a:solidFill>
-                <a:srgbClr val="15AABE"/>
-              </a:solidFill>
-              <a:latin typeface="Arial"/>
-              <a:ea typeface="ＭＳ Ｐゴシック" pitchFamily="-104" charset="-128"/>
-            </a:endParaRPr>
-          </a:p>
-        </p:txBody>
-      </p:sp>
       <p:pic>
         <p:nvPicPr>
           <p:cNvPr id="102" name="Image 101" descr="UC-S2_Pos.png"/>
@@ -17525,7 +16345,7 @@
         </p:blipFill>
         <p:spPr>
           <a:xfrm>
-            <a:off x="6291020" y="2816454"/>
+            <a:off x="5690000" y="2816454"/>
             <a:ext cx="332323" cy="568293"/>
           </a:xfrm>
           <a:prstGeom prst="rect">
@@ -17549,7 +16369,7 @@
         </p:blipFill>
         <p:spPr>
           <a:xfrm>
-            <a:off x="6431518" y="3157433"/>
+            <a:off x="5830498" y="3157433"/>
             <a:ext cx="285306" cy="301230"/>
           </a:xfrm>
           <a:prstGeom prst="rect">
@@ -17579,7 +16399,7 @@
         </p:blipFill>
         <p:spPr>
           <a:xfrm>
-            <a:off x="6879843" y="3174516"/>
+            <a:off x="6278823" y="3174516"/>
             <a:ext cx="332323" cy="568293"/>
           </a:xfrm>
           <a:prstGeom prst="rect">
@@ -17603,7 +16423,7 @@
         </p:blipFill>
         <p:spPr>
           <a:xfrm>
-            <a:off x="7020341" y="3515495"/>
+            <a:off x="6419321" y="3515495"/>
             <a:ext cx="285306" cy="301230"/>
           </a:xfrm>
           <a:prstGeom prst="rect">
@@ -17633,7 +16453,7 @@
         </p:blipFill>
         <p:spPr>
           <a:xfrm>
-            <a:off x="6388206" y="3502816"/>
+            <a:off x="5787186" y="3502816"/>
             <a:ext cx="332323" cy="568293"/>
           </a:xfrm>
           <a:prstGeom prst="rect">
@@ -17657,7 +16477,7 @@
         </p:blipFill>
         <p:spPr>
           <a:xfrm>
-            <a:off x="6528704" y="3843795"/>
+            <a:off x="5927684" y="3843795"/>
             <a:ext cx="285306" cy="301230"/>
           </a:xfrm>
           <a:prstGeom prst="rect">
@@ -17687,7 +16507,7 @@
         </p:blipFill>
         <p:spPr>
           <a:xfrm>
-            <a:off x="5732766" y="1278425"/>
+            <a:off x="5131746" y="1278425"/>
             <a:ext cx="332323" cy="568293"/>
           </a:xfrm>
           <a:prstGeom prst="rect">
@@ -17711,7 +16531,7 @@
         </p:blipFill>
         <p:spPr>
           <a:xfrm>
-            <a:off x="5935127" y="1679939"/>
+            <a:off x="5334107" y="1679939"/>
             <a:ext cx="237016" cy="200429"/>
           </a:xfrm>
           <a:prstGeom prst="rect">
@@ -17741,7 +16561,7 @@
         </p:blipFill>
         <p:spPr>
           <a:xfrm>
-            <a:off x="6438416" y="900214"/>
+            <a:off x="5837396" y="900214"/>
             <a:ext cx="332323" cy="568293"/>
           </a:xfrm>
           <a:prstGeom prst="rect">
@@ -17765,7 +16585,7 @@
         </p:blipFill>
         <p:spPr>
           <a:xfrm>
-            <a:off x="6640777" y="1301728"/>
+            <a:off x="6039757" y="1301728"/>
             <a:ext cx="237016" cy="200429"/>
           </a:xfrm>
           <a:prstGeom prst="rect">
@@ -17795,7 +16615,7 @@
         </p:blipFill>
         <p:spPr>
           <a:xfrm>
-            <a:off x="6915079" y="1312209"/>
+            <a:off x="6314059" y="1312209"/>
             <a:ext cx="332323" cy="568293"/>
           </a:xfrm>
           <a:prstGeom prst="rect">
@@ -17819,7 +16639,7 @@
         </p:blipFill>
         <p:spPr>
           <a:xfrm>
-            <a:off x="7117440" y="1713723"/>
+            <a:off x="6516420" y="1713723"/>
             <a:ext cx="237016" cy="200429"/>
           </a:xfrm>
           <a:prstGeom prst="rect">
@@ -17849,7 +16669,7 @@
         </p:blipFill>
         <p:spPr>
           <a:xfrm>
-            <a:off x="6291020" y="1632465"/>
+            <a:off x="5690000" y="1632465"/>
             <a:ext cx="332323" cy="568293"/>
           </a:xfrm>
           <a:prstGeom prst="rect">
@@ -17873,7 +16693,7 @@
         </p:blipFill>
         <p:spPr>
           <a:xfrm>
-            <a:off x="6493381" y="2033979"/>
+            <a:off x="5892361" y="2033979"/>
             <a:ext cx="237016" cy="200429"/>
           </a:xfrm>
           <a:prstGeom prst="rect">
@@ -17881,6 +16701,272 @@
           </a:prstGeom>
         </p:spPr>
       </p:pic>
+      <p:sp>
+        <p:nvSpPr>
+          <p:cNvPr id="56" name="ZoneTexte 55"/>
+          <p:cNvSpPr txBox="1"/>
+          <p:nvPr/>
+        </p:nvSpPr>
+        <p:spPr>
+          <a:xfrm>
+            <a:off x="6039757" y="4400465"/>
+            <a:ext cx="1223412" cy="461665"/>
+          </a:xfrm>
+          <a:prstGeom prst="rect">
+            <a:avLst/>
+          </a:prstGeom>
+          <a:noFill/>
+        </p:spPr>
+        <p:txBody>
+          <a:bodyPr wrap="none" rtlCol="0">
+            <a:spAutoFit/>
+          </a:bodyPr>
+          <a:lstStyle/>
+          <a:p>
+            <a:pPr defTabSz="914400" eaLnBrk="0" fontAlgn="base" hangingPunct="0">
+              <a:spcBef>
+                <a:spcPct val="0"/>
+              </a:spcBef>
+              <a:spcAft>
+                <a:spcPct val="0"/>
+              </a:spcAft>
+            </a:pPr>
+            <a:r>
+              <a:rPr lang="fr-FR" sz="1200" dirty="0" smtClean="0">
+                <a:solidFill>
+                  <a:srgbClr val="15AABE"/>
+                </a:solidFill>
+                <a:latin typeface="Arial"/>
+                <a:ea typeface="ＭＳ Ｐゴシック" pitchFamily="-104" charset="-128"/>
+              </a:rPr>
+              <a:t>Cluster </a:t>
+            </a:r>
+            <a:r>
+              <a:rPr lang="fr-FR" sz="1200" dirty="0" err="1" smtClean="0">
+                <a:solidFill>
+                  <a:srgbClr val="15AABE"/>
+                </a:solidFill>
+                <a:latin typeface="Arial"/>
+                <a:ea typeface="ＭＳ Ｐゴシック" pitchFamily="-104" charset="-128"/>
+              </a:rPr>
+              <a:t>NoSQL</a:t>
+            </a:r>
+            <a:r>
+              <a:rPr lang="fr-FR" sz="1200" dirty="0">
+                <a:solidFill>
+                  <a:srgbClr val="15AABE"/>
+                </a:solidFill>
+                <a:latin typeface="Arial"/>
+                <a:ea typeface="ＭＳ Ｐゴシック" pitchFamily="-104" charset="-128"/>
+              </a:rPr>
+              <a:t> </a:t>
+            </a:r>
+            <a:endParaRPr lang="fr-FR" sz="1200" dirty="0" smtClean="0">
+              <a:solidFill>
+                <a:srgbClr val="15AABE"/>
+              </a:solidFill>
+              <a:latin typeface="Arial"/>
+              <a:ea typeface="ＭＳ Ｐゴシック" pitchFamily="-104" charset="-128"/>
+            </a:endParaRPr>
+          </a:p>
+          <a:p>
+            <a:pPr defTabSz="914400" eaLnBrk="0" fontAlgn="base" hangingPunct="0">
+              <a:spcBef>
+                <a:spcPct val="0"/>
+              </a:spcBef>
+              <a:spcAft>
+                <a:spcPct val="0"/>
+              </a:spcAft>
+            </a:pPr>
+            <a:r>
+              <a:rPr lang="fr-FR" sz="1200" dirty="0" smtClean="0">
+                <a:solidFill>
+                  <a:srgbClr val="15AABE"/>
+                </a:solidFill>
+                <a:latin typeface="Arial"/>
+                <a:ea typeface="ＭＳ Ｐゴシック" pitchFamily="-104" charset="-128"/>
+              </a:rPr>
+              <a:t>(indexation)</a:t>
+            </a:r>
+            <a:endParaRPr lang="fr-FR" sz="1200" dirty="0">
+              <a:solidFill>
+                <a:srgbClr val="15AABE"/>
+              </a:solidFill>
+              <a:latin typeface="Arial"/>
+              <a:ea typeface="ＭＳ Ｐゴシック" pitchFamily="-104" charset="-128"/>
+            </a:endParaRPr>
+          </a:p>
+        </p:txBody>
+      </p:sp>
+      <p:sp>
+        <p:nvSpPr>
+          <p:cNvPr id="61" name="ZoneTexte 60"/>
+          <p:cNvSpPr txBox="1"/>
+          <p:nvPr/>
+        </p:nvSpPr>
+        <p:spPr>
+          <a:xfrm>
+            <a:off x="6092093" y="2631788"/>
+            <a:ext cx="1364476" cy="461665"/>
+          </a:xfrm>
+          <a:prstGeom prst="rect">
+            <a:avLst/>
+          </a:prstGeom>
+          <a:noFill/>
+        </p:spPr>
+        <p:txBody>
+          <a:bodyPr wrap="none" rtlCol="0">
+            <a:spAutoFit/>
+          </a:bodyPr>
+          <a:lstStyle/>
+          <a:p>
+            <a:pPr defTabSz="914400" eaLnBrk="0" fontAlgn="base" hangingPunct="0">
+              <a:spcBef>
+                <a:spcPct val="0"/>
+              </a:spcBef>
+              <a:spcAft>
+                <a:spcPct val="0"/>
+              </a:spcAft>
+            </a:pPr>
+            <a:r>
+              <a:rPr lang="fr-FR" sz="1200" dirty="0" smtClean="0">
+                <a:solidFill>
+                  <a:srgbClr val="15AABE"/>
+                </a:solidFill>
+                <a:latin typeface="Arial"/>
+                <a:ea typeface="ＭＳ Ｐゴシック" pitchFamily="-104" charset="-128"/>
+              </a:rPr>
+              <a:t>Cluster </a:t>
+            </a:r>
+            <a:r>
+              <a:rPr lang="fr-FR" sz="1200" dirty="0" err="1" smtClean="0">
+                <a:solidFill>
+                  <a:srgbClr val="15AABE"/>
+                </a:solidFill>
+                <a:latin typeface="Arial"/>
+                <a:ea typeface="ＭＳ Ｐゴシック" pitchFamily="-104" charset="-128"/>
+              </a:rPr>
+              <a:t>Big</a:t>
+            </a:r>
+            <a:r>
+              <a:rPr lang="fr-FR" sz="1200" dirty="0" smtClean="0">
+                <a:solidFill>
+                  <a:srgbClr val="15AABE"/>
+                </a:solidFill>
+                <a:latin typeface="Arial"/>
+                <a:ea typeface="ＭＳ Ｐゴシック" pitchFamily="-104" charset="-128"/>
+              </a:rPr>
+              <a:t> DATA</a:t>
+            </a:r>
+          </a:p>
+          <a:p>
+            <a:pPr defTabSz="914400" eaLnBrk="0" fontAlgn="base" hangingPunct="0">
+              <a:spcBef>
+                <a:spcPct val="0"/>
+              </a:spcBef>
+              <a:spcAft>
+                <a:spcPct val="0"/>
+              </a:spcAft>
+            </a:pPr>
+            <a:r>
+              <a:rPr lang="fr-FR" sz="1200" dirty="0" smtClean="0">
+                <a:solidFill>
+                  <a:srgbClr val="15AABE"/>
+                </a:solidFill>
+                <a:latin typeface="Arial"/>
+                <a:ea typeface="ＭＳ Ｐゴシック" pitchFamily="-104" charset="-128"/>
+              </a:rPr>
+              <a:t>(stockage)</a:t>
+            </a:r>
+            <a:endParaRPr lang="fr-FR" sz="1200" dirty="0">
+              <a:solidFill>
+                <a:srgbClr val="15AABE"/>
+              </a:solidFill>
+              <a:latin typeface="Arial"/>
+              <a:ea typeface="ＭＳ Ｐゴシック" pitchFamily="-104" charset="-128"/>
+            </a:endParaRPr>
+          </a:p>
+        </p:txBody>
+      </p:sp>
+      <p:sp>
+        <p:nvSpPr>
+          <p:cNvPr id="90" name="ZoneTexte 89"/>
+          <p:cNvSpPr txBox="1"/>
+          <p:nvPr/>
+        </p:nvSpPr>
+        <p:spPr>
+          <a:xfrm>
+            <a:off x="6155780" y="816760"/>
+            <a:ext cx="1356636" cy="461665"/>
+          </a:xfrm>
+          <a:prstGeom prst="rect">
+            <a:avLst/>
+          </a:prstGeom>
+          <a:noFill/>
+        </p:spPr>
+        <p:txBody>
+          <a:bodyPr wrap="none" rtlCol="0">
+            <a:spAutoFit/>
+          </a:bodyPr>
+          <a:lstStyle/>
+          <a:p>
+            <a:pPr defTabSz="914400" eaLnBrk="0" fontAlgn="base" hangingPunct="0">
+              <a:spcBef>
+                <a:spcPct val="0"/>
+              </a:spcBef>
+              <a:spcAft>
+                <a:spcPct val="0"/>
+              </a:spcAft>
+            </a:pPr>
+            <a:r>
+              <a:rPr lang="fr-FR" sz="1200" dirty="0" smtClean="0">
+                <a:solidFill>
+                  <a:srgbClr val="15AABE"/>
+                </a:solidFill>
+                <a:latin typeface="Arial"/>
+                <a:ea typeface="ＭＳ Ｐゴシック" pitchFamily="-104" charset="-128"/>
+              </a:rPr>
+              <a:t>Cluster </a:t>
+            </a:r>
+            <a:br>
+              <a:rPr lang="fr-FR" sz="1200" dirty="0" smtClean="0">
+                <a:solidFill>
+                  <a:srgbClr val="15AABE"/>
+                </a:solidFill>
+                <a:latin typeface="Arial"/>
+                <a:ea typeface="ＭＳ Ｐゴシック" pitchFamily="-104" charset="-128"/>
+              </a:rPr>
+            </a:br>
+            <a:r>
+              <a:rPr lang="fr-FR" sz="1200" dirty="0" smtClean="0">
+                <a:solidFill>
+                  <a:srgbClr val="15AABE"/>
+                </a:solidFill>
+                <a:latin typeface="Arial"/>
+                <a:ea typeface="ＭＳ Ｐゴシック" pitchFamily="-104" charset="-128"/>
+              </a:rPr>
+              <a:t>machine </a:t>
+            </a:r>
+            <a:r>
+              <a:rPr lang="fr-FR" sz="1200" dirty="0" err="1" smtClean="0">
+                <a:solidFill>
+                  <a:srgbClr val="15AABE"/>
+                </a:solidFill>
+                <a:latin typeface="Arial"/>
+                <a:ea typeface="ＭＳ Ｐゴシック" pitchFamily="-104" charset="-128"/>
+              </a:rPr>
+              <a:t>learning</a:t>
+            </a:r>
+            <a:endParaRPr lang="fr-FR" sz="1200" dirty="0">
+              <a:solidFill>
+                <a:srgbClr val="15AABE"/>
+              </a:solidFill>
+              <a:latin typeface="Arial"/>
+              <a:ea typeface="ＭＳ Ｐゴシック" pitchFamily="-104" charset="-128"/>
+            </a:endParaRPr>
+          </a:p>
+        </p:txBody>
+      </p:sp>
     </p:spTree>
     <p:extLst>
       <p:ext uri="{BB962C8B-B14F-4D97-AF65-F5344CB8AC3E}">

</xml_diff>